<commit_message>
got my talk in my head.... getting on the slides now
</commit_message>
<xml_diff>
--- a/dotet-4-with-a-slice-of-pi.pptx
+++ b/dotet-4-with-a-slice-of-pi.pptx
@@ -17,8 +17,8 @@
     <p:sldId id="312" r:id="rId8"/>
     <p:sldId id="348" r:id="rId9"/>
     <p:sldId id="288" r:id="rId10"/>
-    <p:sldId id="316" r:id="rId11"/>
-    <p:sldId id="364" r:id="rId12"/>
+    <p:sldId id="362" r:id="rId11"/>
+    <p:sldId id="316" r:id="rId12"/>
     <p:sldId id="349" r:id="rId13"/>
     <p:sldId id="333" r:id="rId14"/>
     <p:sldId id="342" r:id="rId15"/>
@@ -181,7 +181,7 @@
             </a:lvl1pPr>
           </a:lstStyle>
           <a:p>
-            <a:endParaRPr lang="en-GB"/>
+            <a:endParaRPr lang="en-GB" dirty="0"/>
           </a:p>
         </p:txBody>
       </p:sp>
@@ -216,7 +216,7 @@
               <a:rPr lang="en-GB" smtClean="0"/>
               <a:t>19/01/2021</a:t>
             </a:fld>
-            <a:endParaRPr lang="en-GB"/>
+            <a:endParaRPr lang="en-GB" dirty="0"/>
           </a:p>
         </p:txBody>
       </p:sp>
@@ -249,7 +249,7 @@
           <a:bodyPr vert="horz" lIns="91440" tIns="45720" rIns="91440" bIns="45720" rtlCol="0" anchor="ctr"/>
           <a:lstStyle/>
           <a:p>
-            <a:endParaRPr lang="en-GB"/>
+            <a:endParaRPr lang="en-GB" dirty="0"/>
           </a:p>
         </p:txBody>
       </p:sp>
@@ -340,7 +340,7 @@
             </a:lvl1pPr>
           </a:lstStyle>
           <a:p>
-            <a:endParaRPr lang="en-GB"/>
+            <a:endParaRPr lang="en-GB" dirty="0"/>
           </a:p>
         </p:txBody>
       </p:sp>
@@ -375,7 +375,7 @@
               <a:rPr lang="en-GB" smtClean="0"/>
               <a:t>‹#›</a:t>
             </a:fld>
-            <a:endParaRPr lang="en-GB"/>
+            <a:endParaRPr lang="en-GB" dirty="0"/>
           </a:p>
         </p:txBody>
       </p:sp>
@@ -526,7 +526,7 @@
           <a:bodyPr/>
           <a:lstStyle/>
           <a:p>
-            <a:endParaRPr lang="en-US"/>
+            <a:endParaRPr lang="en-US" dirty="0"/>
           </a:p>
         </p:txBody>
       </p:sp>
@@ -593,7 +593,7 @@
               </a:pPr>
               <a:t>3</a:t>
             </a:fld>
-            <a:endParaRPr kumimoji="0" lang="en-US" sz="1800" b="0" i="0" u="none" strike="noStrike" kern="0" cap="none" spc="0" normalizeH="0" baseline="0" noProof="0">
+            <a:endParaRPr kumimoji="0" lang="en-US" sz="1800" b="0" i="0" u="none" strike="noStrike" kern="0" cap="none" spc="0" normalizeH="0" baseline="0" noProof="0" dirty="0">
               <a:ln>
                 <a:noFill/>
               </a:ln>
@@ -1399,10 +1399,9 @@
           </a:p>
           <a:p>
             <a:r>
-              <a:rPr lang="en-US"/>
+              <a:rPr lang="en-US" dirty="0"/>
               <a:t>Add Discord link</a:t>
             </a:r>
-            <a:endParaRPr lang="en-US" dirty="0"/>
           </a:p>
         </p:txBody>
       </p:sp>
@@ -1697,41 +1696,46 @@
           <a:p>
             <a:r>
               <a:rPr lang="en-GB" dirty="0"/>
-              <a:t>VS Code, VS community</a:t>
-            </a:r>
-          </a:p>
-          <a:p>
-            <a:r>
-              <a:rPr lang="en-GB" dirty="0" err="1"/>
-              <a:t>Ssh</a:t>
-            </a:r>
+              <a:t>Timeline</a:t>
+            </a:r>
+          </a:p>
+          <a:p>
             <a:r>
               <a:rPr lang="en-GB" dirty="0"/>
-              <a:t> Client (</a:t>
-            </a:r>
-            <a:r>
-              <a:rPr lang="en-GB" dirty="0" err="1"/>
-              <a:t>openssh</a:t>
-            </a:r>
+              <a:t>Supported platforms</a:t>
+            </a:r>
+          </a:p>
+          <a:p>
             <a:r>
               <a:rPr lang="en-GB" dirty="0"/>
-              <a:t> now included on windows 10)</a:t>
-            </a:r>
-          </a:p>
-          <a:p>
+              <a:t>Where to get it</a:t>
+            </a:r>
+          </a:p>
+          <a:p>
+            <a:pPr marL="171450" indent="-171450">
+              <a:buFontTx/>
+              <a:buChar char="-"/>
+            </a:pPr>
             <a:r>
               <a:rPr lang="en-GB" dirty="0"/>
-              <a:t>Installed Linux – VM, WSL2, Raspberry Pi, etc….</a:t>
-            </a:r>
-          </a:p>
-          <a:p>
+              <a:t>Show page and talk about he various bundles</a:t>
+            </a:r>
+          </a:p>
+          <a:p>
+            <a:pPr marL="0" indent="0">
+              <a:buFontTx/>
+              <a:buNone/>
+            </a:pPr>
             <a:endParaRPr lang="en-GB" dirty="0"/>
           </a:p>
           <a:p>
             <a:r>
               <a:rPr lang="en-GB" dirty="0"/>
-              <a:t>My current setup</a:t>
-            </a:r>
+              <a:t>Get some .NET 5 logo and a Microsoft logo….</a:t>
+            </a:r>
+          </a:p>
+          <a:p>
+            <a:endParaRPr lang="en-GB" dirty="0"/>
           </a:p>
         </p:txBody>
       </p:sp>
@@ -1761,7 +1765,7 @@
     </p:spTree>
     <p:extLst>
       <p:ext uri="{BB962C8B-B14F-4D97-AF65-F5344CB8AC3E}">
-        <p14:creationId xmlns:p14="http://schemas.microsoft.com/office/powerpoint/2010/main" val="4161031071"/>
+        <p14:creationId xmlns:p14="http://schemas.microsoft.com/office/powerpoint/2010/main" val="3707884149"/>
       </p:ext>
     </p:extLst>
   </p:cSld>
@@ -1817,27 +1821,31 @@
           <a:p>
             <a:r>
               <a:rPr lang="en-GB" dirty="0"/>
-              <a:t>VS Code Dev on the </a:t>
-            </a:r>
+              <a:t>VS Code, VS community</a:t>
+            </a:r>
+          </a:p>
+          <a:p>
             <a:r>
               <a:rPr lang="en-GB" dirty="0" err="1"/>
-              <a:t>rpi</a:t>
+              <a:t>Ssh</a:t>
             </a:r>
             <a:r>
               <a:rPr lang="en-GB" dirty="0"/>
-              <a:t> and edit on the windows?  Headless pi</a:t>
-            </a:r>
-          </a:p>
-          <a:p>
+              <a:t> Client (</a:t>
+            </a:r>
+            <a:r>
+              <a:rPr lang="en-GB" dirty="0" err="1"/>
+              <a:t>openssh</a:t>
+            </a:r>
             <a:r>
               <a:rPr lang="en-GB" dirty="0"/>
-              <a:t>VS Code Dev on windows and push to the pi.</a:t>
+              <a:t> now included on windows 10)</a:t>
             </a:r>
           </a:p>
           <a:p>
             <a:r>
               <a:rPr lang="en-GB" dirty="0"/>
-              <a:t>VS Community  --- exercise for the student</a:t>
+              <a:t>Installed Linux – VM, WSL2, Raspberry Pi, etc….</a:t>
             </a:r>
           </a:p>
           <a:p>
@@ -1846,140 +1854,7 @@
           <a:p>
             <a:r>
               <a:rPr lang="en-GB" dirty="0"/>
-              <a:t>Types of exec’s produced:</a:t>
-            </a:r>
-          </a:p>
-          <a:p>
-            <a:r>
-              <a:rPr lang="en-GB" dirty="0"/>
-              <a:t>Self-Contained</a:t>
-            </a:r>
-          </a:p>
-          <a:p>
-            <a:pPr marL="171450" indent="-171450">
-              <a:buFontTx/>
-              <a:buChar char="-"/>
-            </a:pPr>
-            <a:r>
-              <a:rPr lang="en-GB" dirty="0"/>
-              <a:t>Control framework in use</a:t>
-            </a:r>
-          </a:p>
-          <a:p>
-            <a:pPr marL="171450" indent="-171450">
-              <a:buFontTx/>
-              <a:buChar char="-"/>
-            </a:pPr>
-            <a:r>
-              <a:rPr lang="en-GB" dirty="0"/>
-              <a:t>Faster </a:t>
-            </a:r>
-            <a:r>
-              <a:rPr lang="en-GB" dirty="0" err="1"/>
-              <a:t>startup</a:t>
-            </a:r>
-            <a:endParaRPr lang="en-GB" dirty="0"/>
-          </a:p>
-          <a:p>
-            <a:pPr marL="171450" indent="-171450">
-              <a:buFontTx/>
-              <a:buChar char="-"/>
-            </a:pPr>
-            <a:r>
-              <a:rPr lang="en-GB" dirty="0"/>
-              <a:t>Larger </a:t>
-            </a:r>
-            <a:r>
-              <a:rPr lang="en-GB" dirty="0" err="1"/>
-              <a:t>dist</a:t>
-            </a:r>
-            <a:r>
-              <a:rPr lang="en-GB" dirty="0"/>
-              <a:t> size</a:t>
-            </a:r>
-          </a:p>
-          <a:p>
-            <a:pPr marL="171450" indent="-171450">
-              <a:buFontTx/>
-              <a:buChar char="-"/>
-            </a:pPr>
-            <a:endParaRPr lang="en-GB" dirty="0"/>
-          </a:p>
-          <a:p>
-            <a:r>
-              <a:rPr lang="en-GB" dirty="0"/>
-              <a:t>Framework-Dependent</a:t>
-            </a:r>
-          </a:p>
-          <a:p>
-            <a:pPr marL="171450" indent="-171450">
-              <a:buFontTx/>
-              <a:buChar char="-"/>
-            </a:pPr>
-            <a:r>
-              <a:rPr lang="en-GB" dirty="0"/>
-              <a:t>/</a:t>
-            </a:r>
-            <a:r>
-              <a:rPr lang="en-GB" dirty="0" err="1"/>
-              <a:t>usr</a:t>
-            </a:r>
-            <a:r>
-              <a:rPr lang="en-GB" dirty="0"/>
-              <a:t>/share/dotnet </a:t>
-            </a:r>
-          </a:p>
-          <a:p>
-            <a:pPr marL="171450" indent="-171450">
-              <a:buFontTx/>
-              <a:buChar char="-"/>
-            </a:pPr>
-            <a:r>
-              <a:rPr lang="en-GB" dirty="0"/>
-              <a:t>cross-platform </a:t>
-            </a:r>
-            <a:r>
-              <a:rPr lang="en-GB" dirty="0" err="1"/>
-              <a:t>dll</a:t>
-            </a:r>
-            <a:endParaRPr lang="en-GB" dirty="0"/>
-          </a:p>
-          <a:p>
-            <a:pPr marL="171450" indent="-171450">
-              <a:buFontTx/>
-              <a:buChar char="-"/>
-            </a:pPr>
-            <a:r>
-              <a:rPr lang="en-GB" dirty="0"/>
-              <a:t>Slow to start</a:t>
-            </a:r>
-          </a:p>
-          <a:p>
-            <a:pPr marL="171450" indent="-171450">
-              <a:buFontTx/>
-              <a:buChar char="-"/>
-            </a:pPr>
-            <a:r>
-              <a:rPr lang="en-GB" dirty="0"/>
-              <a:t>dotnet &lt;app.dll&gt;</a:t>
-            </a:r>
-          </a:p>
-          <a:p>
-            <a:pPr marL="171450" indent="-171450">
-              <a:buFontTx/>
-              <a:buChar char="-"/>
-            </a:pPr>
-            <a:r>
-              <a:rPr lang="en-GB" dirty="0"/>
-              <a:t>Small </a:t>
-            </a:r>
-            <a:r>
-              <a:rPr lang="en-GB" dirty="0" err="1"/>
-              <a:t>dist</a:t>
-            </a:r>
-            <a:r>
-              <a:rPr lang="en-GB" dirty="0"/>
-              <a:t> size.</a:t>
+              <a:t>My current setup</a:t>
             </a:r>
           </a:p>
         </p:txBody>
@@ -2010,7 +1885,7 @@
     </p:spTree>
     <p:extLst>
       <p:ext uri="{BB962C8B-B14F-4D97-AF65-F5344CB8AC3E}">
-        <p14:creationId xmlns:p14="http://schemas.microsoft.com/office/powerpoint/2010/main" val="575543865"/>
+        <p14:creationId xmlns:p14="http://schemas.microsoft.com/office/powerpoint/2010/main" val="4161031071"/>
       </p:ext>
     </p:extLst>
   </p:cSld>
@@ -2693,14 +2568,6 @@
 <file path=ppt/slideLayouts/slideLayout1.xml><?xml version="1.0" encoding="utf-8"?>
 <p:sldLayout xmlns:a="http://schemas.openxmlformats.org/drawingml/2006/main" xmlns:r="http://schemas.openxmlformats.org/officeDocument/2006/relationships" xmlns:p="http://schemas.openxmlformats.org/presentationml/2006/main" type="title" preserve="1">
   <p:cSld name="Title Slide">
-    <p:bg>
-      <p:bgPr>
-        <a:solidFill>
-          <a:srgbClr val="C00000"/>
-        </a:solidFill>
-        <a:effectLst/>
-      </p:bgPr>
-    </p:bg>
     <p:spTree>
       <p:nvGrpSpPr>
         <p:cNvPr id="1" name=""/>
@@ -2863,7 +2730,7 @@
               <a:rPr lang="en-GB" smtClean="0"/>
               <a:t>19/01/2021</a:t>
             </a:fld>
-            <a:endParaRPr lang="en-GB"/>
+            <a:endParaRPr lang="en-GB" dirty="0"/>
           </a:p>
         </p:txBody>
       </p:sp>
@@ -2896,7 +2763,7 @@
           <a:bodyPr/>
           <a:lstStyle/>
           <a:p>
-            <a:endParaRPr lang="en-GB"/>
+            <a:endParaRPr lang="en-GB" dirty="0"/>
           </a:p>
         </p:txBody>
       </p:sp>
@@ -2933,7 +2800,7 @@
               <a:rPr lang="en-GB" smtClean="0"/>
               <a:t>‹#›</a:t>
             </a:fld>
-            <a:endParaRPr lang="en-GB"/>
+            <a:endParaRPr lang="en-GB" dirty="0"/>
           </a:p>
         </p:txBody>
       </p:sp>
@@ -3103,7 +2970,7 @@
               <a:rPr lang="en-GB" smtClean="0"/>
               <a:t>19/01/2021</a:t>
             </a:fld>
-            <a:endParaRPr lang="en-GB"/>
+            <a:endParaRPr lang="en-GB" dirty="0"/>
           </a:p>
         </p:txBody>
       </p:sp>
@@ -3136,7 +3003,7 @@
           <a:bodyPr/>
           <a:lstStyle/>
           <a:p>
-            <a:endParaRPr lang="en-GB"/>
+            <a:endParaRPr lang="en-GB" dirty="0"/>
           </a:p>
         </p:txBody>
       </p:sp>
@@ -3173,7 +3040,7 @@
               <a:rPr lang="en-GB" smtClean="0"/>
               <a:t>‹#›</a:t>
             </a:fld>
-            <a:endParaRPr lang="en-GB"/>
+            <a:endParaRPr lang="en-GB" dirty="0"/>
           </a:p>
         </p:txBody>
       </p:sp>
@@ -3343,7 +3210,7 @@
               <a:rPr lang="en-GB" smtClean="0"/>
               <a:t>19/01/2021</a:t>
             </a:fld>
-            <a:endParaRPr lang="en-GB"/>
+            <a:endParaRPr lang="en-GB" dirty="0"/>
           </a:p>
         </p:txBody>
       </p:sp>
@@ -3376,7 +3243,7 @@
           <a:bodyPr/>
           <a:lstStyle/>
           <a:p>
-            <a:endParaRPr lang="en-GB"/>
+            <a:endParaRPr lang="en-GB" dirty="0"/>
           </a:p>
         </p:txBody>
       </p:sp>
@@ -3413,7 +3280,7 @@
               <a:rPr lang="en-GB" smtClean="0"/>
               <a:t>‹#›</a:t>
             </a:fld>
-            <a:endParaRPr lang="en-GB"/>
+            <a:endParaRPr lang="en-GB" dirty="0"/>
           </a:p>
         </p:txBody>
       </p:sp>
@@ -3491,7 +3358,7 @@
           <a:lstStyle/>
           <a:p>
             <a:pPr algn="ctr"/>
-            <a:endParaRPr lang="en-US" sz="1350"/>
+            <a:endParaRPr lang="en-US" sz="1350" dirty="0"/>
           </a:p>
         </p:txBody>
       </p:sp>
@@ -3994,7 +3861,7 @@
               <a:rPr lang="en-US" smtClean="0"/>
               <a:t>1/19/2021</a:t>
             </a:fld>
-            <a:endParaRPr lang="en-US"/>
+            <a:endParaRPr lang="en-US" dirty="0"/>
           </a:p>
         </p:txBody>
       </p:sp>
@@ -4031,7 +3898,7 @@
             </a:lvl1pPr>
           </a:lstStyle>
           <a:p>
-            <a:endParaRPr lang="en-US"/>
+            <a:endParaRPr lang="en-US" dirty="0"/>
           </a:p>
         </p:txBody>
       </p:sp>
@@ -4074,7 +3941,7 @@
               <a:pPr algn="l"/>
               <a:t>‹#›</a:t>
             </a:fld>
-            <a:endParaRPr lang="en-US"/>
+            <a:endParaRPr lang="en-US" dirty="0"/>
           </a:p>
         </p:txBody>
       </p:sp>
@@ -4152,7 +4019,7 @@
           <a:lstStyle/>
           <a:p>
             <a:pPr algn="ctr"/>
-            <a:endParaRPr lang="en-US" sz="1350"/>
+            <a:endParaRPr lang="en-US" sz="1350" dirty="0"/>
           </a:p>
         </p:txBody>
       </p:sp>
@@ -4388,7 +4255,7 @@
           <a:lstStyle/>
           <a:p>
             <a:pPr algn="ctr"/>
-            <a:endParaRPr lang="en-US" sz="1350"/>
+            <a:endParaRPr lang="en-US" sz="1350" dirty="0"/>
           </a:p>
         </p:txBody>
       </p:sp>
@@ -4962,7 +4829,7 @@
               <a:rPr lang="en-US" smtClean="0"/>
               <a:t>1/19/2021</a:t>
             </a:fld>
-            <a:endParaRPr lang="en-US"/>
+            <a:endParaRPr lang="en-US" dirty="0"/>
           </a:p>
         </p:txBody>
       </p:sp>
@@ -4999,7 +4866,7 @@
             </a:lvl1pPr>
           </a:lstStyle>
           <a:p>
-            <a:endParaRPr lang="en-US"/>
+            <a:endParaRPr lang="en-US" dirty="0"/>
           </a:p>
         </p:txBody>
       </p:sp>
@@ -5042,7 +4909,7 @@
               <a:pPr algn="l"/>
               <a:t>‹#›</a:t>
             </a:fld>
-            <a:endParaRPr lang="en-US"/>
+            <a:endParaRPr lang="en-US" dirty="0"/>
           </a:p>
         </p:txBody>
       </p:sp>
@@ -5099,7 +4966,7 @@
               <a:buNone/>
               <a:defRPr sz="1800" b="1">
                 <a:solidFill>
-                  <a:schemeClr val="accent6"/>
+                  <a:schemeClr val="bg1"/>
                 </a:solidFill>
               </a:defRPr>
             </a:lvl1pPr>
@@ -5139,7 +5006,7 @@
           <a:p>
             <a:pPr lvl="0"/>
             <a:r>
-              <a:rPr lang="en-US"/>
+              <a:rPr lang="en-US" dirty="0"/>
               <a:t>Click to edit Master text styles</a:t>
             </a:r>
           </a:p>
@@ -5165,37 +5032,43 @@
           <a:bodyPr/>
           <a:lstStyle>
             <a:lvl1pPr>
+              <a:buClr>
+                <a:schemeClr val="bg1"/>
+              </a:buClr>
               <a:defRPr sz="1800">
                 <a:solidFill>
-                  <a:schemeClr val="accent6"/>
+                  <a:schemeClr val="bg1"/>
                 </a:solidFill>
               </a:defRPr>
             </a:lvl1pPr>
             <a:lvl2pPr>
+              <a:buClr>
+                <a:schemeClr val="bg1"/>
+              </a:buClr>
               <a:defRPr sz="1500">
                 <a:solidFill>
-                  <a:schemeClr val="accent6"/>
+                  <a:schemeClr val="bg1"/>
                 </a:solidFill>
               </a:defRPr>
             </a:lvl2pPr>
             <a:lvl3pPr>
               <a:defRPr sz="1350">
                 <a:solidFill>
-                  <a:schemeClr val="accent6"/>
+                  <a:schemeClr val="bg1"/>
                 </a:solidFill>
               </a:defRPr>
             </a:lvl3pPr>
             <a:lvl4pPr>
               <a:defRPr sz="1200">
                 <a:solidFill>
-                  <a:schemeClr val="accent6"/>
+                  <a:schemeClr val="bg1"/>
                 </a:solidFill>
               </a:defRPr>
             </a:lvl4pPr>
             <a:lvl5pPr>
               <a:defRPr sz="1200">
                 <a:solidFill>
-                  <a:schemeClr val="accent6"/>
+                  <a:schemeClr val="bg1"/>
                 </a:solidFill>
               </a:defRPr>
             </a:lvl5pPr>
@@ -5215,35 +5088,35 @@
           <a:p>
             <a:pPr lvl="0"/>
             <a:r>
-              <a:rPr lang="en-US"/>
+              <a:rPr lang="en-US" dirty="0"/>
               <a:t>Click to edit Master text styles</a:t>
             </a:r>
           </a:p>
           <a:p>
             <a:pPr lvl="1"/>
             <a:r>
-              <a:rPr lang="en-US"/>
+              <a:rPr lang="en-US" dirty="0"/>
               <a:t>Second level</a:t>
             </a:r>
           </a:p>
           <a:p>
             <a:pPr lvl="2"/>
             <a:r>
-              <a:rPr lang="en-US"/>
+              <a:rPr lang="en-US" dirty="0"/>
               <a:t>Third level</a:t>
             </a:r>
           </a:p>
           <a:p>
             <a:pPr lvl="3"/>
             <a:r>
-              <a:rPr lang="en-US"/>
+              <a:rPr lang="en-US" dirty="0"/>
               <a:t>Fourth level</a:t>
             </a:r>
           </a:p>
           <a:p>
             <a:pPr lvl="4"/>
             <a:r>
-              <a:rPr lang="en-US"/>
+              <a:rPr lang="en-US" dirty="0"/>
               <a:t>Fifth level</a:t>
             </a:r>
           </a:p>
@@ -5272,7 +5145,7 @@
               <a:buNone/>
               <a:defRPr sz="1800" b="1">
                 <a:solidFill>
-                  <a:schemeClr val="accent6"/>
+                  <a:schemeClr val="bg1"/>
                 </a:solidFill>
               </a:defRPr>
             </a:lvl1pPr>
@@ -5312,7 +5185,7 @@
           <a:p>
             <a:pPr lvl="0"/>
             <a:r>
-              <a:rPr lang="en-US"/>
+              <a:rPr lang="en-US" dirty="0"/>
               <a:t>Click to edit Master text styles</a:t>
             </a:r>
           </a:p>
@@ -5338,37 +5211,43 @@
           <a:bodyPr/>
           <a:lstStyle>
             <a:lvl1pPr>
+              <a:buClr>
+                <a:schemeClr val="bg1"/>
+              </a:buClr>
               <a:defRPr sz="1800">
                 <a:solidFill>
-                  <a:schemeClr val="accent6"/>
+                  <a:schemeClr val="bg1"/>
                 </a:solidFill>
               </a:defRPr>
             </a:lvl1pPr>
             <a:lvl2pPr>
+              <a:buClr>
+                <a:schemeClr val="bg1"/>
+              </a:buClr>
               <a:defRPr sz="1500">
                 <a:solidFill>
-                  <a:schemeClr val="accent6"/>
+                  <a:schemeClr val="bg1"/>
                 </a:solidFill>
               </a:defRPr>
             </a:lvl2pPr>
             <a:lvl3pPr>
               <a:defRPr sz="1350">
                 <a:solidFill>
-                  <a:schemeClr val="accent6"/>
+                  <a:schemeClr val="bg1"/>
                 </a:solidFill>
               </a:defRPr>
             </a:lvl3pPr>
             <a:lvl4pPr>
               <a:defRPr sz="1200">
                 <a:solidFill>
-                  <a:schemeClr val="accent6"/>
+                  <a:schemeClr val="bg1"/>
                 </a:solidFill>
               </a:defRPr>
             </a:lvl4pPr>
             <a:lvl5pPr>
               <a:defRPr sz="1200">
                 <a:solidFill>
-                  <a:schemeClr val="accent6"/>
+                  <a:schemeClr val="bg1"/>
                 </a:solidFill>
               </a:defRPr>
             </a:lvl5pPr>
@@ -5388,35 +5267,35 @@
           <a:p>
             <a:pPr lvl="0"/>
             <a:r>
-              <a:rPr lang="en-US"/>
+              <a:rPr lang="en-US" dirty="0"/>
               <a:t>Click to edit Master text styles</a:t>
             </a:r>
           </a:p>
           <a:p>
             <a:pPr lvl="1"/>
             <a:r>
-              <a:rPr lang="en-US"/>
+              <a:rPr lang="en-US" dirty="0"/>
               <a:t>Second level</a:t>
             </a:r>
           </a:p>
           <a:p>
             <a:pPr lvl="2"/>
             <a:r>
-              <a:rPr lang="en-US"/>
+              <a:rPr lang="en-US" dirty="0"/>
               <a:t>Third level</a:t>
             </a:r>
           </a:p>
           <a:p>
             <a:pPr lvl="3"/>
             <a:r>
-              <a:rPr lang="en-US"/>
+              <a:rPr lang="en-US" dirty="0"/>
               <a:t>Fourth level</a:t>
             </a:r>
           </a:p>
           <a:p>
             <a:pPr lvl="4"/>
             <a:r>
-              <a:rPr lang="en-US"/>
+              <a:rPr lang="en-US" dirty="0"/>
               <a:t>Fifth level</a:t>
             </a:r>
           </a:p>
@@ -5446,7 +5325,7 @@
             <a:lvl1pPr>
               <a:defRPr sz="3600" b="1" i="0" baseline="0">
                 <a:solidFill>
-                  <a:schemeClr val="tx1"/>
+                  <a:schemeClr val="bg1"/>
                 </a:solidFill>
                 <a:latin typeface="+mj-lt"/>
                 <a:ea typeface="Tahoma" charset="0"/>
@@ -5456,7 +5335,7 @@
           </a:lstStyle>
           <a:p>
             <a:r>
-              <a:rPr lang="en-US"/>
+              <a:rPr lang="en-US" dirty="0"/>
               <a:t>Slide Title</a:t>
             </a:r>
           </a:p>
@@ -5487,7 +5366,7 @@
               <a:buNone/>
               <a:defRPr sz="1600" b="0" i="0">
                 <a:solidFill>
-                  <a:schemeClr val="tx1"/>
+                  <a:schemeClr val="bg1"/>
                 </a:solidFill>
                 <a:latin typeface="+mn-lt"/>
                 <a:ea typeface="Tahoma" charset="0"/>
@@ -5577,7 +5456,7 @@
           </a:lstStyle>
           <a:p>
             <a:r>
-              <a:rPr lang="en-US"/>
+              <a:rPr lang="en-US" dirty="0"/>
               <a:t>Click to edit Master subtitle style </a:t>
             </a:r>
           </a:p>
@@ -5620,7 +5499,7 @@
               <a:rPr lang="en-US" smtClean="0"/>
               <a:t>1/19/2021</a:t>
             </a:fld>
-            <a:endParaRPr lang="en-US"/>
+            <a:endParaRPr lang="en-US" dirty="0"/>
           </a:p>
         </p:txBody>
       </p:sp>
@@ -5657,7 +5536,7 @@
             </a:lvl1pPr>
           </a:lstStyle>
           <a:p>
-            <a:endParaRPr lang="en-US"/>
+            <a:endParaRPr lang="en-US" dirty="0"/>
           </a:p>
         </p:txBody>
       </p:sp>
@@ -5700,7 +5579,7 @@
               <a:pPr algn="l"/>
               <a:t>‹#›</a:t>
             </a:fld>
-            <a:endParaRPr lang="en-US"/>
+            <a:endParaRPr lang="en-US" dirty="0"/>
           </a:p>
         </p:txBody>
       </p:sp>
@@ -5932,7 +5811,7 @@
               <a:rPr lang="en-US" smtClean="0"/>
               <a:t>1/19/2021</a:t>
             </a:fld>
-            <a:endParaRPr lang="en-US"/>
+            <a:endParaRPr lang="en-US" dirty="0"/>
           </a:p>
         </p:txBody>
       </p:sp>
@@ -5969,7 +5848,7 @@
             </a:lvl1pPr>
           </a:lstStyle>
           <a:p>
-            <a:endParaRPr lang="en-US"/>
+            <a:endParaRPr lang="en-US" dirty="0"/>
           </a:p>
         </p:txBody>
       </p:sp>
@@ -6012,7 +5891,7 @@
               <a:pPr algn="l"/>
               <a:t>‹#›</a:t>
             </a:fld>
-            <a:endParaRPr lang="en-US"/>
+            <a:endParaRPr lang="en-US" dirty="0"/>
           </a:p>
         </p:txBody>
       </p:sp>
@@ -6092,7 +5971,7 @@
           <a:lstStyle/>
           <a:p>
             <a:pPr algn="ctr"/>
-            <a:endParaRPr lang="en-US" sz="1350">
+            <a:endParaRPr lang="en-US" sz="1350" dirty="0">
               <a:solidFill>
                 <a:schemeClr val="tx1"/>
               </a:solidFill>
@@ -6142,7 +6021,7 @@
           <a:lstStyle/>
           <a:p>
             <a:pPr algn="ctr"/>
-            <a:endParaRPr lang="en-US" sz="1350">
+            <a:endParaRPr lang="en-US" sz="1350" dirty="0">
               <a:solidFill>
                 <a:schemeClr val="bg2"/>
               </a:solidFill>
@@ -6181,7 +6060,7 @@
             </a:lvl1pPr>
           </a:lstStyle>
           <a:p>
-            <a:endParaRPr lang="en-US"/>
+            <a:endParaRPr lang="en-US" dirty="0"/>
           </a:p>
         </p:txBody>
       </p:sp>
@@ -6221,7 +6100,7 @@
               <a:pPr/>
               <a:t>‹#›</a:t>
             </a:fld>
-            <a:endParaRPr lang="en-US"/>
+            <a:endParaRPr lang="en-US" dirty="0"/>
           </a:p>
         </p:txBody>
       </p:sp>
@@ -6272,7 +6151,7 @@
           <a:lstStyle/>
           <a:p>
             <a:pPr algn="ctr"/>
-            <a:endParaRPr lang="en-US" sz="1350"/>
+            <a:endParaRPr lang="en-US" sz="1350" dirty="0"/>
           </a:p>
         </p:txBody>
       </p:sp>
@@ -6402,7 +6281,7 @@
           <a:lstStyle/>
           <a:p>
             <a:pPr algn="ctr"/>
-            <a:endParaRPr lang="en-US" sz="1350"/>
+            <a:endParaRPr lang="en-US" sz="1350" dirty="0"/>
           </a:p>
         </p:txBody>
       </p:sp>
@@ -6431,7 +6310,7 @@
           </a:bodyPr>
           <a:lstStyle/>
           <a:p>
-            <a:endParaRPr lang="en-US"/>
+            <a:endParaRPr lang="en-US" dirty="0"/>
           </a:p>
         </p:txBody>
       </p:sp>
@@ -6709,7 +6588,7 @@
               <a:rPr lang="en-GB" smtClean="0"/>
               <a:t>19/01/2021</a:t>
             </a:fld>
-            <a:endParaRPr lang="en-GB"/>
+            <a:endParaRPr lang="en-GB" dirty="0"/>
           </a:p>
         </p:txBody>
       </p:sp>
@@ -6742,7 +6621,7 @@
           <a:bodyPr/>
           <a:lstStyle/>
           <a:p>
-            <a:endParaRPr lang="en-GB"/>
+            <a:endParaRPr lang="en-GB" dirty="0"/>
           </a:p>
         </p:txBody>
       </p:sp>
@@ -6779,7 +6658,7 @@
               <a:rPr lang="en-GB" smtClean="0"/>
               <a:t>‹#›</a:t>
             </a:fld>
-            <a:endParaRPr lang="en-GB"/>
+            <a:endParaRPr lang="en-GB" dirty="0"/>
           </a:p>
         </p:txBody>
       </p:sp>
@@ -6859,7 +6738,7 @@
           <a:lstStyle/>
           <a:p>
             <a:pPr algn="ctr"/>
-            <a:endParaRPr lang="en-US" sz="1350"/>
+            <a:endParaRPr lang="en-US" sz="1350" dirty="0"/>
           </a:p>
         </p:txBody>
       </p:sp>
@@ -6925,7 +6804,7 @@
           </a:lstStyle>
           <a:p>
             <a:r>
-              <a:rPr lang="en-US"/>
+              <a:rPr lang="en-US" dirty="0"/>
               <a:t>Drag picture to placeholder or click icon to add</a:t>
             </a:r>
           </a:p>
@@ -7017,7 +6896,7 @@
                 <a:lstStyle/>
                 <a:p>
                   <a:pPr algn="ctr"/>
-                  <a:endParaRPr lang="en-US" sz="1350"/>
+                  <a:endParaRPr lang="en-US" sz="1350" dirty="0"/>
                 </a:p>
               </p:txBody>
             </p:sp>
@@ -7065,7 +6944,7 @@
                 <a:lstStyle/>
                 <a:p>
                   <a:pPr algn="ctr"/>
-                  <a:endParaRPr lang="en-US" sz="1350"/>
+                  <a:endParaRPr lang="en-US" sz="1350" dirty="0"/>
                 </a:p>
               </p:txBody>
             </p:sp>
@@ -7113,7 +6992,7 @@
                 <a:lstStyle/>
                 <a:p>
                   <a:pPr algn="ctr"/>
-                  <a:endParaRPr lang="en-US" sz="1350"/>
+                  <a:endParaRPr lang="en-US" sz="1350" dirty="0"/>
                 </a:p>
               </p:txBody>
             </p:sp>
@@ -7176,7 +7055,7 @@
                 <a:lstStyle/>
                 <a:p>
                   <a:pPr algn="ctr"/>
-                  <a:endParaRPr lang="en-US" sz="1350"/>
+                  <a:endParaRPr lang="en-US" sz="1350" dirty="0"/>
                 </a:p>
               </p:txBody>
             </p:sp>
@@ -7224,7 +7103,7 @@
                 <a:lstStyle/>
                 <a:p>
                   <a:pPr algn="ctr"/>
-                  <a:endParaRPr lang="en-US" sz="1350"/>
+                  <a:endParaRPr lang="en-US" sz="1350" dirty="0"/>
                 </a:p>
               </p:txBody>
             </p:sp>
@@ -7272,7 +7151,7 @@
                 <a:lstStyle/>
                 <a:p>
                   <a:pPr algn="ctr"/>
-                  <a:endParaRPr lang="en-US" sz="1350"/>
+                  <a:endParaRPr lang="en-US" sz="1350" dirty="0"/>
                 </a:p>
               </p:txBody>
             </p:sp>
@@ -7335,7 +7214,7 @@
                 <a:lstStyle/>
                 <a:p>
                   <a:pPr algn="ctr"/>
-                  <a:endParaRPr lang="en-US" sz="1350"/>
+                  <a:endParaRPr lang="en-US" sz="1350" dirty="0"/>
                 </a:p>
               </p:txBody>
             </p:sp>
@@ -7383,7 +7262,7 @@
                 <a:lstStyle/>
                 <a:p>
                   <a:pPr algn="ctr"/>
-                  <a:endParaRPr lang="en-US" sz="1350"/>
+                  <a:endParaRPr lang="en-US" sz="1350" dirty="0"/>
                 </a:p>
               </p:txBody>
             </p:sp>
@@ -7431,7 +7310,7 @@
                 <a:lstStyle/>
                 <a:p>
                   <a:pPr algn="ctr"/>
-                  <a:endParaRPr lang="en-US" sz="1350"/>
+                  <a:endParaRPr lang="en-US" sz="1350" dirty="0"/>
                 </a:p>
               </p:txBody>
             </p:sp>
@@ -7480,7 +7359,7 @@
               <a:lstStyle/>
               <a:p>
                 <a:pPr algn="ctr"/>
-                <a:endParaRPr lang="en-US" sz="1350"/>
+                <a:endParaRPr lang="en-US" sz="1350" dirty="0"/>
               </a:p>
             </p:txBody>
           </p:sp>
@@ -7528,7 +7407,7 @@
               <a:lstStyle/>
               <a:p>
                 <a:pPr algn="ctr"/>
-                <a:endParaRPr lang="en-US" sz="1350"/>
+                <a:endParaRPr lang="en-US" sz="1350" dirty="0"/>
               </a:p>
             </p:txBody>
           </p:sp>
@@ -7576,7 +7455,7 @@
               <a:lstStyle/>
               <a:p>
                 <a:pPr algn="ctr"/>
-                <a:endParaRPr lang="en-US" sz="1350"/>
+                <a:endParaRPr lang="en-US" sz="1350" dirty="0"/>
               </a:p>
             </p:txBody>
           </p:sp>
@@ -7720,7 +7599,7 @@
             <a:lstStyle/>
             <a:p>
               <a:pPr algn="ctr"/>
-              <a:endParaRPr lang="en-US" sz="1350"/>
+              <a:endParaRPr lang="en-US" sz="1350" dirty="0"/>
             </a:p>
           </p:txBody>
         </p:sp>
@@ -7823,7 +7702,7 @@
             <a:lstStyle/>
             <a:p>
               <a:pPr algn="ctr"/>
-              <a:endParaRPr lang="en-US" sz="1350"/>
+              <a:endParaRPr lang="en-US" sz="1350" dirty="0"/>
             </a:p>
           </p:txBody>
         </p:sp>
@@ -7896,7 +7775,7 @@
             <a:lstStyle/>
             <a:p>
               <a:pPr algn="ctr"/>
-              <a:endParaRPr lang="en-US" sz="1350"/>
+              <a:endParaRPr lang="en-US" sz="1350" dirty="0"/>
             </a:p>
           </p:txBody>
         </p:sp>
@@ -8019,7 +7898,7 @@
             <a:lstStyle/>
             <a:p>
               <a:pPr algn="ctr"/>
-              <a:endParaRPr lang="en-US" sz="1350"/>
+              <a:endParaRPr lang="en-US" sz="1350" dirty="0"/>
             </a:p>
           </p:txBody>
         </p:sp>
@@ -8180,7 +8059,7 @@
             <a:lstStyle/>
             <a:p>
               <a:pPr algn="ctr"/>
-              <a:endParaRPr lang="en-US" sz="1350"/>
+              <a:endParaRPr lang="en-US" sz="1350" dirty="0"/>
             </a:p>
           </p:txBody>
         </p:sp>
@@ -8235,7 +8114,7 @@
             <a:lstStyle/>
             <a:p>
               <a:pPr algn="ctr"/>
-              <a:endParaRPr lang="en-US" sz="1350"/>
+              <a:endParaRPr lang="en-US" sz="1350" dirty="0"/>
             </a:p>
           </p:txBody>
         </p:sp>
@@ -8290,7 +8169,7 @@
             <a:lstStyle/>
             <a:p>
               <a:pPr algn="ctr"/>
-              <a:endParaRPr lang="en-US" sz="1350"/>
+              <a:endParaRPr lang="en-US" sz="1350" dirty="0"/>
             </a:p>
           </p:txBody>
         </p:sp>
@@ -8345,7 +8224,7 @@
             <a:lstStyle/>
             <a:p>
               <a:pPr algn="ctr"/>
-              <a:endParaRPr lang="en-US" sz="1350"/>
+              <a:endParaRPr lang="en-US" sz="1350" dirty="0"/>
             </a:p>
           </p:txBody>
         </p:sp>
@@ -8400,7 +8279,7 @@
             <a:lstStyle/>
             <a:p>
               <a:pPr algn="ctr"/>
-              <a:endParaRPr lang="en-US" sz="1350"/>
+              <a:endParaRPr lang="en-US" sz="1350" dirty="0"/>
             </a:p>
           </p:txBody>
         </p:sp>
@@ -8455,7 +8334,7 @@
             <a:lstStyle/>
             <a:p>
               <a:pPr algn="ctr"/>
-              <a:endParaRPr lang="en-US" sz="1350"/>
+              <a:endParaRPr lang="en-US" sz="1350" dirty="0"/>
             </a:p>
           </p:txBody>
         </p:sp>
@@ -8602,7 +8481,7 @@
             <a:lstStyle/>
             <a:p>
               <a:pPr algn="ctr"/>
-              <a:endParaRPr lang="en-US" sz="1350"/>
+              <a:endParaRPr lang="en-US" sz="1350" dirty="0"/>
             </a:p>
           </p:txBody>
         </p:sp>
@@ -8657,7 +8536,7 @@
             <a:lstStyle/>
             <a:p>
               <a:pPr algn="ctr"/>
-              <a:endParaRPr lang="en-US" sz="1350"/>
+              <a:endParaRPr lang="en-US" sz="1350" dirty="0"/>
             </a:p>
           </p:txBody>
         </p:sp>
@@ -8712,7 +8591,7 @@
             <a:lstStyle/>
             <a:p>
               <a:pPr algn="ctr"/>
-              <a:endParaRPr lang="en-US" sz="1350"/>
+              <a:endParaRPr lang="en-US" sz="1350" dirty="0"/>
             </a:p>
           </p:txBody>
         </p:sp>
@@ -8767,7 +8646,7 @@
             <a:lstStyle/>
             <a:p>
               <a:pPr algn="ctr"/>
-              <a:endParaRPr lang="en-US" sz="1350"/>
+              <a:endParaRPr lang="en-US" sz="1350" dirty="0"/>
             </a:p>
           </p:txBody>
         </p:sp>
@@ -8822,7 +8701,7 @@
             <a:lstStyle/>
             <a:p>
               <a:pPr algn="ctr"/>
-              <a:endParaRPr lang="en-US" sz="1350"/>
+              <a:endParaRPr lang="en-US" sz="1350" dirty="0"/>
             </a:p>
           </p:txBody>
         </p:sp>
@@ -8877,7 +8756,7 @@
             <a:lstStyle/>
             <a:p>
               <a:pPr algn="ctr"/>
-              <a:endParaRPr lang="en-US" sz="1350"/>
+              <a:endParaRPr lang="en-US" sz="1350" dirty="0"/>
             </a:p>
           </p:txBody>
         </p:sp>
@@ -8932,7 +8811,7 @@
             <a:lstStyle/>
             <a:p>
               <a:pPr algn="ctr"/>
-              <a:endParaRPr lang="en-US" sz="1350"/>
+              <a:endParaRPr lang="en-US" sz="1350" dirty="0"/>
             </a:p>
           </p:txBody>
         </p:sp>
@@ -8987,7 +8866,7 @@
             <a:lstStyle/>
             <a:p>
               <a:pPr algn="ctr"/>
-              <a:endParaRPr lang="en-US" sz="1350"/>
+              <a:endParaRPr lang="en-US" sz="1350" dirty="0"/>
             </a:p>
           </p:txBody>
         </p:sp>
@@ -9042,7 +8921,7 @@
             <a:lstStyle/>
             <a:p>
               <a:pPr algn="ctr"/>
-              <a:endParaRPr lang="en-US" sz="1350"/>
+              <a:endParaRPr lang="en-US" sz="1350" dirty="0"/>
             </a:p>
           </p:txBody>
         </p:sp>
@@ -9097,7 +8976,7 @@
             <a:lstStyle/>
             <a:p>
               <a:pPr algn="ctr"/>
-              <a:endParaRPr lang="en-US" sz="1350"/>
+              <a:endParaRPr lang="en-US" sz="1350" dirty="0"/>
             </a:p>
           </p:txBody>
         </p:sp>
@@ -9244,7 +9123,7 @@
             <a:lstStyle/>
             <a:p>
               <a:pPr algn="ctr"/>
-              <a:endParaRPr lang="en-US" sz="1350"/>
+              <a:endParaRPr lang="en-US" sz="1350" dirty="0"/>
             </a:p>
           </p:txBody>
         </p:sp>
@@ -9391,7 +9270,7 @@
             <a:lstStyle/>
             <a:p>
               <a:pPr algn="ctr"/>
-              <a:endParaRPr lang="en-US" sz="1350"/>
+              <a:endParaRPr lang="en-US" sz="1350" dirty="0"/>
             </a:p>
           </p:txBody>
         </p:sp>
@@ -9537,7 +9416,7 @@
               <a:rPr lang="en-US" smtClean="0"/>
               <a:t>1/19/2021</a:t>
             </a:fld>
-            <a:endParaRPr lang="en-US"/>
+            <a:endParaRPr lang="en-US" dirty="0"/>
           </a:p>
         </p:txBody>
       </p:sp>
@@ -9574,7 +9453,7 @@
             </a:lvl1pPr>
           </a:lstStyle>
           <a:p>
-            <a:endParaRPr lang="en-US"/>
+            <a:endParaRPr lang="en-US" dirty="0"/>
           </a:p>
         </p:txBody>
       </p:sp>
@@ -9617,7 +9496,7 @@
               <a:pPr algn="l"/>
               <a:t>‹#›</a:t>
             </a:fld>
-            <a:endParaRPr lang="en-US"/>
+            <a:endParaRPr lang="en-US" dirty="0"/>
           </a:p>
         </p:txBody>
       </p:sp>
@@ -9905,7 +9784,7 @@
               <a:rPr lang="en-US" smtClean="0"/>
               <a:t>1/19/2021</a:t>
             </a:fld>
-            <a:endParaRPr lang="en-US"/>
+            <a:endParaRPr lang="en-US" dirty="0"/>
           </a:p>
         </p:txBody>
       </p:sp>
@@ -9942,7 +9821,7 @@
             </a:lvl1pPr>
           </a:lstStyle>
           <a:p>
-            <a:endParaRPr lang="en-US"/>
+            <a:endParaRPr lang="en-US" dirty="0"/>
           </a:p>
         </p:txBody>
       </p:sp>
@@ -9985,7 +9864,7 @@
               <a:pPr algn="l"/>
               <a:t>‹#›</a:t>
             </a:fld>
-            <a:endParaRPr lang="en-US"/>
+            <a:endParaRPr lang="en-US" dirty="0"/>
           </a:p>
         </p:txBody>
       </p:sp>
@@ -10125,7 +10004,7 @@
           <a:bodyPr/>
           <a:lstStyle/>
           <a:p>
-            <a:endParaRPr lang="en-US"/>
+            <a:endParaRPr lang="en-US" dirty="0"/>
           </a:p>
         </p:txBody>
       </p:sp>
@@ -10152,7 +10031,7 @@
           <a:bodyPr/>
           <a:lstStyle/>
           <a:p>
-            <a:endParaRPr lang="en-US"/>
+            <a:endParaRPr lang="en-US" dirty="0"/>
           </a:p>
         </p:txBody>
       </p:sp>
@@ -10183,7 +10062,7 @@
               <a:rPr lang="en-US" smtClean="0"/>
               <a:t>‹#›</a:t>
             </a:fld>
-            <a:endParaRPr lang="en-US"/>
+            <a:endParaRPr lang="en-US" dirty="0"/>
           </a:p>
         </p:txBody>
       </p:sp>
@@ -10419,7 +10298,7 @@
               <a:rPr lang="en-GB" smtClean="0"/>
               <a:t>19/01/2021</a:t>
             </a:fld>
-            <a:endParaRPr lang="en-GB"/>
+            <a:endParaRPr lang="en-GB" dirty="0"/>
           </a:p>
         </p:txBody>
       </p:sp>
@@ -10452,7 +10331,7 @@
           <a:bodyPr/>
           <a:lstStyle/>
           <a:p>
-            <a:endParaRPr lang="en-GB"/>
+            <a:endParaRPr lang="en-GB" dirty="0"/>
           </a:p>
         </p:txBody>
       </p:sp>
@@ -10489,7 +10368,7 @@
               <a:rPr lang="en-GB" smtClean="0"/>
               <a:t>‹#›</a:t>
             </a:fld>
-            <a:endParaRPr lang="en-GB"/>
+            <a:endParaRPr lang="en-GB" dirty="0"/>
           </a:p>
         </p:txBody>
       </p:sp>
@@ -10725,7 +10604,7 @@
               <a:rPr lang="en-GB" smtClean="0"/>
               <a:t>19/01/2021</a:t>
             </a:fld>
-            <a:endParaRPr lang="en-GB"/>
+            <a:endParaRPr lang="en-GB" dirty="0"/>
           </a:p>
         </p:txBody>
       </p:sp>
@@ -10758,7 +10637,7 @@
           <a:bodyPr/>
           <a:lstStyle/>
           <a:p>
-            <a:endParaRPr lang="en-GB"/>
+            <a:endParaRPr lang="en-GB" dirty="0"/>
           </a:p>
         </p:txBody>
       </p:sp>
@@ -10795,7 +10674,7 @@
               <a:rPr lang="en-GB" smtClean="0"/>
               <a:t>‹#›</a:t>
             </a:fld>
-            <a:endParaRPr lang="en-GB"/>
+            <a:endParaRPr lang="en-GB" dirty="0"/>
           </a:p>
         </p:txBody>
       </p:sp>
@@ -11179,7 +11058,7 @@
               <a:rPr lang="en-GB" smtClean="0"/>
               <a:t>19/01/2021</a:t>
             </a:fld>
-            <a:endParaRPr lang="en-GB"/>
+            <a:endParaRPr lang="en-GB" dirty="0"/>
           </a:p>
         </p:txBody>
       </p:sp>
@@ -11212,7 +11091,7 @@
           <a:bodyPr/>
           <a:lstStyle/>
           <a:p>
-            <a:endParaRPr lang="en-GB"/>
+            <a:endParaRPr lang="en-GB" dirty="0"/>
           </a:p>
         </p:txBody>
       </p:sp>
@@ -11249,7 +11128,7 @@
               <a:rPr lang="en-GB" smtClean="0"/>
               <a:t>‹#›</a:t>
             </a:fld>
-            <a:endParaRPr lang="en-GB"/>
+            <a:endParaRPr lang="en-GB" dirty="0"/>
           </a:p>
         </p:txBody>
       </p:sp>
@@ -11353,7 +11232,7 @@
               <a:rPr lang="en-GB" smtClean="0"/>
               <a:t>19/01/2021</a:t>
             </a:fld>
-            <a:endParaRPr lang="en-GB"/>
+            <a:endParaRPr lang="en-GB" dirty="0"/>
           </a:p>
         </p:txBody>
       </p:sp>
@@ -11386,7 +11265,7 @@
           <a:bodyPr/>
           <a:lstStyle/>
           <a:p>
-            <a:endParaRPr lang="en-GB"/>
+            <a:endParaRPr lang="en-GB" dirty="0"/>
           </a:p>
         </p:txBody>
       </p:sp>
@@ -11423,7 +11302,7 @@
               <a:rPr lang="en-GB" smtClean="0"/>
               <a:t>‹#›</a:t>
             </a:fld>
-            <a:endParaRPr lang="en-GB"/>
+            <a:endParaRPr lang="en-GB" dirty="0"/>
           </a:p>
         </p:txBody>
       </p:sp>
@@ -11490,7 +11369,7 @@
               <a:rPr lang="en-GB" smtClean="0"/>
               <a:t>19/01/2021</a:t>
             </a:fld>
-            <a:endParaRPr lang="en-GB"/>
+            <a:endParaRPr lang="en-GB" dirty="0"/>
           </a:p>
         </p:txBody>
       </p:sp>
@@ -11523,7 +11402,7 @@
           <a:bodyPr/>
           <a:lstStyle/>
           <a:p>
-            <a:endParaRPr lang="en-GB"/>
+            <a:endParaRPr lang="en-GB" dirty="0"/>
           </a:p>
         </p:txBody>
       </p:sp>
@@ -11560,7 +11439,7 @@
               <a:rPr lang="en-GB" smtClean="0"/>
               <a:t>‹#›</a:t>
             </a:fld>
-            <a:endParaRPr lang="en-GB"/>
+            <a:endParaRPr lang="en-GB" dirty="0"/>
           </a:p>
         </p:txBody>
       </p:sp>
@@ -11836,7 +11715,7 @@
               <a:rPr lang="en-GB" smtClean="0"/>
               <a:t>19/01/2021</a:t>
             </a:fld>
-            <a:endParaRPr lang="en-GB"/>
+            <a:endParaRPr lang="en-GB" dirty="0"/>
           </a:p>
         </p:txBody>
       </p:sp>
@@ -11869,7 +11748,7 @@
           <a:bodyPr/>
           <a:lstStyle/>
           <a:p>
-            <a:endParaRPr lang="en-GB"/>
+            <a:endParaRPr lang="en-GB" dirty="0"/>
           </a:p>
         </p:txBody>
       </p:sp>
@@ -11906,7 +11785,7 @@
               <a:rPr lang="en-GB" smtClean="0"/>
               <a:t>‹#›</a:t>
             </a:fld>
-            <a:endParaRPr lang="en-GB"/>
+            <a:endParaRPr lang="en-GB" dirty="0"/>
           </a:p>
         </p:txBody>
       </p:sp>
@@ -12047,7 +11926,7 @@
             </a:lvl9pPr>
           </a:lstStyle>
           <a:p>
-            <a:endParaRPr lang="en-GB"/>
+            <a:endParaRPr lang="en-GB" dirty="0"/>
           </a:p>
         </p:txBody>
       </p:sp>
@@ -12158,7 +12037,7 @@
               <a:rPr lang="en-GB" smtClean="0"/>
               <a:t>19/01/2021</a:t>
             </a:fld>
-            <a:endParaRPr lang="en-GB"/>
+            <a:endParaRPr lang="en-GB" dirty="0"/>
           </a:p>
         </p:txBody>
       </p:sp>
@@ -12191,7 +12070,7 @@
           <a:bodyPr/>
           <a:lstStyle/>
           <a:p>
-            <a:endParaRPr lang="en-GB"/>
+            <a:endParaRPr lang="en-GB" dirty="0"/>
           </a:p>
         </p:txBody>
       </p:sp>
@@ -12228,7 +12107,7 @@
               <a:rPr lang="en-GB" smtClean="0"/>
               <a:t>‹#›</a:t>
             </a:fld>
-            <a:endParaRPr lang="en-GB"/>
+            <a:endParaRPr lang="en-GB" dirty="0"/>
           </a:p>
         </p:txBody>
       </p:sp>
@@ -12249,9 +12128,12 @@
 <p:sldMaster xmlns:a="http://schemas.openxmlformats.org/drawingml/2006/main" xmlns:r="http://schemas.openxmlformats.org/officeDocument/2006/relationships" xmlns:p="http://schemas.openxmlformats.org/presentationml/2006/main">
   <p:cSld>
     <p:bg>
-      <p:bgRef idx="1001">
-        <a:schemeClr val="bg1"/>
-      </p:bgRef>
+      <p:bgPr>
+        <a:solidFill>
+          <a:srgbClr val="005596"/>
+        </a:solidFill>
+        <a:effectLst/>
+      </p:bgPr>
     </p:bg>
     <p:spTree>
       <p:nvGrpSpPr>
@@ -12577,9 +12459,7 @@
     <p:bg>
       <p:bgPr>
         <a:solidFill>
-          <a:schemeClr val="bg1">
-            <a:alpha val="0"/>
-          </a:schemeClr>
+          <a:srgbClr val="005596"/>
         </a:solidFill>
         <a:effectLst/>
       </p:bgPr>
@@ -12756,7 +12636,7 @@
               <a:rPr lang="en-US" smtClean="0"/>
               <a:t>1/19/2021</a:t>
             </a:fld>
-            <a:endParaRPr lang="en-US"/>
+            <a:endParaRPr lang="en-US" dirty="0"/>
           </a:p>
         </p:txBody>
       </p:sp>
@@ -12793,7 +12673,7 @@
             </a:lvl1pPr>
           </a:lstStyle>
           <a:p>
-            <a:endParaRPr lang="en-US"/>
+            <a:endParaRPr lang="en-US" dirty="0"/>
           </a:p>
         </p:txBody>
       </p:sp>
@@ -12835,7 +12715,7 @@
               <a:pPr/>
               <a:t>‹#›</a:t>
             </a:fld>
-            <a:endParaRPr lang="en-US"/>
+            <a:endParaRPr lang="en-US" dirty="0"/>
           </a:p>
         </p:txBody>
       </p:sp>
@@ -13295,14 +13175,6 @@
 <file path=ppt/slides/slide10.xml><?xml version="1.0" encoding="utf-8"?>
 <p:sld xmlns:a="http://schemas.openxmlformats.org/drawingml/2006/main" xmlns:r="http://schemas.openxmlformats.org/officeDocument/2006/relationships" xmlns:p="http://schemas.openxmlformats.org/presentationml/2006/main">
   <p:cSld>
-    <p:bg>
-      <p:bgPr>
-        <a:solidFill>
-          <a:schemeClr val="accent1"/>
-        </a:solidFill>
-        <a:effectLst/>
-      </p:bgPr>
-    </p:bg>
     <p:spTree>
       <p:nvGrpSpPr>
         <p:cNvPr id="1" name=""/>
@@ -13355,56 +13227,334 @@
       </p:pic>
       <p:sp>
         <p:nvSpPr>
-          <p:cNvPr id="9" name="TextBox 8">
+          <p:cNvPr id="30" name="Text Placeholder 29">
             <a:extLst>
               <a:ext uri="{FF2B5EF4-FFF2-40B4-BE49-F238E27FC236}">
-                <a16:creationId xmlns:a16="http://schemas.microsoft.com/office/drawing/2014/main" id="{CE13B2C7-8710-4B96-8FDD-A270EBA25012}"/>
+                <a16:creationId xmlns:a16="http://schemas.microsoft.com/office/drawing/2014/main" id="{D11E1948-7CE3-4AD8-A626-214AD7DA351E}"/>
               </a:ext>
             </a:extLst>
           </p:cNvPr>
-          <p:cNvSpPr txBox="1"/>
-          <p:nvPr/>
-        </p:nvSpPr>
-        <p:spPr>
-          <a:xfrm>
-            <a:off x="1417834" y="770562"/>
-            <a:ext cx="5034337" cy="369332"/>
-          </a:xfrm>
-          <a:prstGeom prst="rect">
-            <a:avLst/>
-          </a:prstGeom>
-          <a:noFill/>
-        </p:spPr>
-        <p:txBody>
-          <a:bodyPr wrap="square" rtlCol="0">
-            <a:spAutoFit/>
-          </a:bodyPr>
+          <p:cNvSpPr>
+            <a:spLocks noGrp="1"/>
+          </p:cNvSpPr>
+          <p:nvPr>
+            <p:ph type="body" idx="1"/>
+          </p:nvPr>
+        </p:nvSpPr>
+        <p:spPr/>
+        <p:txBody>
+          <a:bodyPr/>
           <a:lstStyle/>
           <a:p>
             <a:r>
               <a:rPr lang="en-US" dirty="0"/>
-              <a:t>Common ways of doing this dev…..</a:t>
-            </a:r>
+              <a:t>Have to have:</a:t>
+            </a:r>
+          </a:p>
+        </p:txBody>
+      </p:sp>
+      <p:sp>
+        <p:nvSpPr>
+          <p:cNvPr id="31" name="Content Placeholder 30">
+            <a:extLst>
+              <a:ext uri="{FF2B5EF4-FFF2-40B4-BE49-F238E27FC236}">
+                <a16:creationId xmlns:a16="http://schemas.microsoft.com/office/drawing/2014/main" id="{80A24A11-B8D3-476D-88B6-EC0D9A58D32D}"/>
+              </a:ext>
+            </a:extLst>
+          </p:cNvPr>
+          <p:cNvSpPr>
+            <a:spLocks noGrp="1"/>
+          </p:cNvSpPr>
+          <p:nvPr>
+            <p:ph sz="half" idx="2"/>
+          </p:nvPr>
+        </p:nvSpPr>
+        <p:spPr/>
+        <p:txBody>
+          <a:bodyPr/>
+          <a:lstStyle/>
+          <a:p>
+            <a:r>
+              <a:rPr lang="en-US" dirty="0"/>
+              <a:t>Supported OS</a:t>
+            </a:r>
+          </a:p>
+          <a:p>
+            <a:pPr lvl="1"/>
+            <a:r>
+              <a:rPr lang="en-US" dirty="0"/>
+              <a:t>Ubuntu 20.04 in this presentation</a:t>
+            </a:r>
+          </a:p>
+          <a:p>
+            <a:r>
+              <a:rPr lang="en-US" dirty="0"/>
+              <a:t>.NET 5 SDK for your OS</a:t>
+            </a:r>
+          </a:p>
+          <a:p>
+            <a:pPr lvl="1"/>
+            <a:r>
+              <a:rPr lang="en-US" dirty="0"/>
+              <a:t>Microsoft’s prod package installed</a:t>
+            </a:r>
+          </a:p>
+          <a:p>
+            <a:r>
+              <a:rPr lang="en-US" dirty="0"/>
+              <a:t>Raspberry Pi 4</a:t>
+            </a:r>
+          </a:p>
+          <a:p>
+            <a:pPr lvl="1"/>
+            <a:r>
+              <a:rPr lang="en-US" dirty="0"/>
+              <a:t>Pi 3’s will work.  Sorry Pi 2’s there is a current bug</a:t>
+            </a:r>
+          </a:p>
+          <a:p>
+            <a:r>
+              <a:rPr lang="en-US" dirty="0"/>
+              <a:t>Your favorite Linux editor</a:t>
+            </a:r>
+          </a:p>
+          <a:p>
+            <a:pPr lvl="1"/>
+            <a:r>
+              <a:rPr lang="en-US" dirty="0"/>
+              <a:t>I like vi.  Anyone still use </a:t>
+            </a:r>
+            <a:r>
+              <a:rPr lang="en-US" dirty="0" err="1"/>
+              <a:t>emac’s</a:t>
+            </a:r>
+            <a:r>
+              <a:rPr lang="en-US" dirty="0"/>
+              <a:t>?</a:t>
+            </a:r>
+          </a:p>
+          <a:p>
+            <a:r>
+              <a:rPr lang="en-US" dirty="0"/>
+              <a:t>A network connection</a:t>
+            </a:r>
+          </a:p>
+          <a:p>
+            <a:pPr lvl="1"/>
+            <a:r>
+              <a:rPr lang="en-US" dirty="0"/>
+              <a:t>Guessing I shouldn’t have to say this.</a:t>
+            </a:r>
+          </a:p>
+          <a:p>
+            <a:r>
+              <a:rPr lang="en-US" dirty="0"/>
+              <a:t>Access to ‘root’ on the Linux OS</a:t>
+            </a:r>
+          </a:p>
+          <a:p>
+            <a:endParaRPr lang="en-US" dirty="0"/>
+          </a:p>
+          <a:p>
+            <a:endParaRPr lang="en-US" dirty="0"/>
+          </a:p>
+          <a:p>
+            <a:endParaRPr lang="en-US" dirty="0"/>
+          </a:p>
+        </p:txBody>
+      </p:sp>
+      <p:sp>
+        <p:nvSpPr>
+          <p:cNvPr id="32" name="Text Placeholder 31">
+            <a:extLst>
+              <a:ext uri="{FF2B5EF4-FFF2-40B4-BE49-F238E27FC236}">
+                <a16:creationId xmlns:a16="http://schemas.microsoft.com/office/drawing/2014/main" id="{A9053FB2-11AC-432A-8E85-47785D64D686}"/>
+              </a:ext>
+            </a:extLst>
+          </p:cNvPr>
+          <p:cNvSpPr>
+            <a:spLocks noGrp="1"/>
+          </p:cNvSpPr>
+          <p:nvPr>
+            <p:ph type="body" sz="quarter" idx="3"/>
+          </p:nvPr>
+        </p:nvSpPr>
+        <p:spPr/>
+        <p:txBody>
+          <a:bodyPr/>
+          <a:lstStyle/>
+          <a:p>
+            <a:r>
+              <a:rPr lang="en-US" dirty="0"/>
+              <a:t>Nice to have:</a:t>
+            </a:r>
+          </a:p>
+        </p:txBody>
+      </p:sp>
+      <p:sp>
+        <p:nvSpPr>
+          <p:cNvPr id="33" name="Content Placeholder 32">
+            <a:extLst>
+              <a:ext uri="{FF2B5EF4-FFF2-40B4-BE49-F238E27FC236}">
+                <a16:creationId xmlns:a16="http://schemas.microsoft.com/office/drawing/2014/main" id="{5BAD6938-EC7D-4E30-BE4E-F5C92ED0F4B5}"/>
+              </a:ext>
+            </a:extLst>
+          </p:cNvPr>
+          <p:cNvSpPr>
+            <a:spLocks noGrp="1"/>
+          </p:cNvSpPr>
+          <p:nvPr>
+            <p:ph sz="quarter" idx="4"/>
+          </p:nvPr>
+        </p:nvSpPr>
+        <p:spPr/>
+        <p:txBody>
+          <a:bodyPr/>
+          <a:lstStyle/>
+          <a:p>
+            <a:r>
+              <a:rPr lang="en-US" dirty="0"/>
+              <a:t>Visual Studio Code</a:t>
+            </a:r>
+          </a:p>
+          <a:p>
+            <a:pPr lvl="1"/>
+            <a:r>
+              <a:rPr lang="en-US" dirty="0"/>
+              <a:t>Visual Studio Community </a:t>
+            </a:r>
+          </a:p>
+          <a:p>
+            <a:pPr lvl="1"/>
+            <a:r>
+              <a:rPr lang="en-US" dirty="0"/>
+              <a:t>There are a few extensions</a:t>
+            </a:r>
+          </a:p>
+          <a:p>
+            <a:pPr lvl="2">
+              <a:buClr>
+                <a:schemeClr val="bg1"/>
+              </a:buClr>
+            </a:pPr>
+            <a:r>
+              <a:rPr lang="en-US" dirty="0"/>
+              <a:t>Remote Development Extension Pack</a:t>
+            </a:r>
+          </a:p>
+          <a:p>
+            <a:r>
+              <a:rPr lang="en-US" dirty="0"/>
+              <a:t>Access to an SSH client</a:t>
+            </a:r>
+          </a:p>
+          <a:p>
+            <a:pPr lvl="1"/>
+            <a:r>
+              <a:rPr lang="en-US" dirty="0"/>
+              <a:t>OpenSSH is now on Windows 10</a:t>
+            </a:r>
+          </a:p>
+          <a:p>
+            <a:r>
+              <a:rPr lang="en-US" dirty="0"/>
+              <a:t>WSL2</a:t>
+            </a:r>
+          </a:p>
+          <a:p>
+            <a:r>
+              <a:rPr lang="en-US" dirty="0"/>
+              <a:t>Windows Terminal</a:t>
+            </a:r>
+          </a:p>
+          <a:p>
+            <a:r>
+              <a:rPr lang="en-US" dirty="0"/>
+              <a:t>.NET 5 SDK for your remote OS</a:t>
+            </a:r>
+          </a:p>
+          <a:p>
+            <a:pPr lvl="1"/>
+            <a:r>
+              <a:rPr lang="en-US" dirty="0"/>
+              <a:t>Windows 10 </a:t>
+            </a:r>
+          </a:p>
+          <a:p>
+            <a:endParaRPr lang="en-US" dirty="0"/>
+          </a:p>
+        </p:txBody>
+      </p:sp>
+      <p:sp>
+        <p:nvSpPr>
+          <p:cNvPr id="29" name="Title 28">
+            <a:extLst>
+              <a:ext uri="{FF2B5EF4-FFF2-40B4-BE49-F238E27FC236}">
+                <a16:creationId xmlns:a16="http://schemas.microsoft.com/office/drawing/2014/main" id="{8FC696E4-A916-42CB-91E3-BADBEA1CB8E2}"/>
+              </a:ext>
+            </a:extLst>
+          </p:cNvPr>
+          <p:cNvSpPr>
+            <a:spLocks noGrp="1"/>
+          </p:cNvSpPr>
+          <p:nvPr>
+            <p:ph type="title"/>
+          </p:nvPr>
+        </p:nvSpPr>
+        <p:spPr/>
+        <p:txBody>
+          <a:bodyPr/>
+          <a:lstStyle/>
+          <a:p>
+            <a:r>
+              <a:rPr lang="en-US" dirty="0"/>
+              <a:t>Requirements….</a:t>
+            </a:r>
+          </a:p>
+        </p:txBody>
+      </p:sp>
+      <p:sp>
+        <p:nvSpPr>
+          <p:cNvPr id="34" name="Subtitle 33">
+            <a:extLst>
+              <a:ext uri="{FF2B5EF4-FFF2-40B4-BE49-F238E27FC236}">
+                <a16:creationId xmlns:a16="http://schemas.microsoft.com/office/drawing/2014/main" id="{336DB9DB-864E-4CFA-91E6-CC25660C61AD}"/>
+              </a:ext>
+            </a:extLst>
+          </p:cNvPr>
+          <p:cNvSpPr>
+            <a:spLocks noGrp="1"/>
+          </p:cNvSpPr>
+          <p:nvPr>
+            <p:ph type="subTitle" idx="15"/>
+          </p:nvPr>
+        </p:nvSpPr>
+        <p:spPr/>
+        <p:txBody>
+          <a:bodyPr/>
+          <a:lstStyle/>
+          <a:p>
+            <a:endParaRPr lang="en-US"/>
           </a:p>
         </p:txBody>
       </p:sp>
     </p:spTree>
     <p:extLst>
       <p:ext uri="{BB962C8B-B14F-4D97-AF65-F5344CB8AC3E}">
-        <p14:creationId xmlns:p14="http://schemas.microsoft.com/office/powerpoint/2010/main" val="263912073"/>
+        <p14:creationId xmlns:p14="http://schemas.microsoft.com/office/powerpoint/2010/main" val="1072499855"/>
       </p:ext>
     </p:extLst>
   </p:cSld>
   <p:clrMapOvr>
     <a:masterClrMapping/>
   </p:clrMapOvr>
-  <mc:AlternateContent xmlns:mc="http://schemas.openxmlformats.org/markup-compatibility/2006">
-    <mc:Choice xmlns:p14="http://schemas.microsoft.com/office/powerpoint/2010/main" Requires="p14">
+  <mc:AlternateContent xmlns:mc="http://schemas.openxmlformats.org/markup-compatibility/2006" xmlns:p14="http://schemas.microsoft.com/office/powerpoint/2010/main">
+    <mc:Choice Requires="p14">
       <p:transition spd="med" p14:dur="700">
         <p:fade/>
       </p:transition>
     </mc:Choice>
-    <mc:Fallback>
+    <mc:Fallback xmlns="">
       <p:transition spd="med">
         <p:fade/>
       </p:transition>
@@ -13416,14 +13566,6 @@
 <file path=ppt/slides/slide11.xml><?xml version="1.0" encoding="utf-8"?>
 <p:sld xmlns:a="http://schemas.openxmlformats.org/drawingml/2006/main" xmlns:r="http://schemas.openxmlformats.org/officeDocument/2006/relationships" xmlns:p="http://schemas.openxmlformats.org/presentationml/2006/main">
   <p:cSld>
-    <p:bg>
-      <p:bgPr>
-        <a:solidFill>
-          <a:schemeClr val="accent1"/>
-        </a:solidFill>
-        <a:effectLst/>
-      </p:bgPr>
-    </p:bg>
     <p:spTree>
       <p:nvGrpSpPr>
         <p:cNvPr id="1" name=""/>
@@ -13452,7 +13594,7 @@
         </p:nvSpPr>
         <p:spPr>
           <a:xfrm>
-            <a:off x="544749" y="437744"/>
+            <a:off x="518181" y="-143281"/>
             <a:ext cx="11155638" cy="1210011"/>
           </a:xfrm>
           <a:prstGeom prst="rect">
@@ -13466,16 +13608,14 @@
           </a:bodyPr>
           <a:lstStyle/>
           <a:p>
-            <a:pPr marL="571500" indent="-571500">
+            <a:pPr>
               <a:lnSpc>
                 <a:spcPct val="150000"/>
               </a:lnSpc>
-              <a:buFont typeface="Arial" panose="020B0604020202020204" pitchFamily="34" charset="0"/>
-              <a:buChar char="•"/>
             </a:pPr>
             <a:r>
               <a:rPr lang="en-US" sz="5400" dirty="0"/>
-              <a:t>Pre-setup</a:t>
+              <a:t>Setup</a:t>
             </a:r>
           </a:p>
         </p:txBody>
@@ -13516,6 +13656,38 @@
           </a:prstGeom>
         </p:spPr>
       </p:pic>
+      <p:sp>
+        <p:nvSpPr>
+          <p:cNvPr id="10" name="TextBox 9">
+            <a:extLst>
+              <a:ext uri="{FF2B5EF4-FFF2-40B4-BE49-F238E27FC236}">
+                <a16:creationId xmlns:a16="http://schemas.microsoft.com/office/drawing/2014/main" id="{03A11BAF-FFC8-4681-8480-5C3B72BF8978}"/>
+              </a:ext>
+            </a:extLst>
+          </p:cNvPr>
+          <p:cNvSpPr txBox="1"/>
+          <p:nvPr/>
+        </p:nvSpPr>
+        <p:spPr>
+          <a:xfrm>
+            <a:off x="504825" y="1447800"/>
+            <a:ext cx="11163300" cy="1552575"/>
+          </a:xfrm>
+          <a:prstGeom prst="rect">
+            <a:avLst/>
+          </a:prstGeom>
+          <a:noFill/>
+        </p:spPr>
+        <p:txBody>
+          <a:bodyPr wrap="square" rtlCol="0">
+            <a:spAutoFit/>
+          </a:bodyPr>
+          <a:lstStyle/>
+          <a:p>
+            <a:endParaRPr lang="en-US"/>
+          </a:p>
+        </p:txBody>
+      </p:sp>
     </p:spTree>
     <p:extLst>
       <p:ext uri="{BB962C8B-B14F-4D97-AF65-F5344CB8AC3E}">
@@ -13544,14 +13716,6 @@
 <file path=ppt/slides/slide12.xml><?xml version="1.0" encoding="utf-8"?>
 <p:sld xmlns:a="http://schemas.openxmlformats.org/drawingml/2006/main" xmlns:r="http://schemas.openxmlformats.org/officeDocument/2006/relationships" xmlns:p="http://schemas.openxmlformats.org/presentationml/2006/main">
   <p:cSld>
-    <p:bg>
-      <p:bgPr>
-        <a:solidFill>
-          <a:schemeClr val="accent1"/>
-        </a:solidFill>
-        <a:effectLst/>
-      </p:bgPr>
-    </p:bg>
     <p:spTree>
       <p:nvGrpSpPr>
         <p:cNvPr id="1" name=""/>
@@ -13661,14 +13825,6 @@
 <file path=ppt/slides/slide13.xml><?xml version="1.0" encoding="utf-8"?>
 <p:sld xmlns:a="http://schemas.openxmlformats.org/drawingml/2006/main" xmlns:r="http://schemas.openxmlformats.org/officeDocument/2006/relationships" xmlns:p="http://schemas.openxmlformats.org/presentationml/2006/main">
   <p:cSld>
-    <p:bg>
-      <p:bgPr>
-        <a:solidFill>
-          <a:schemeClr val="accent1"/>
-        </a:solidFill>
-        <a:effectLst/>
-      </p:bgPr>
-    </p:bg>
     <p:spTree>
       <p:nvGrpSpPr>
         <p:cNvPr id="1" name=""/>
@@ -13787,14 +13943,6 @@
 <file path=ppt/slides/slide14.xml><?xml version="1.0" encoding="utf-8"?>
 <p:sld xmlns:a="http://schemas.openxmlformats.org/drawingml/2006/main" xmlns:r="http://schemas.openxmlformats.org/officeDocument/2006/relationships" xmlns:p="http://schemas.openxmlformats.org/presentationml/2006/main">
   <p:cSld>
-    <p:bg>
-      <p:bgPr>
-        <a:solidFill>
-          <a:schemeClr val="accent1"/>
-        </a:solidFill>
-        <a:effectLst/>
-      </p:bgPr>
-    </p:bg>
     <p:spTree>
       <p:nvGrpSpPr>
         <p:cNvPr id="1" name=""/>
@@ -13847,10 +13995,83 @@
       </p:pic>
       <p:sp>
         <p:nvSpPr>
-          <p:cNvPr id="86" name="TextBox 85">
+          <p:cNvPr id="9" name="Picture Placeholder 8">
             <a:extLst>
               <a:ext uri="{FF2B5EF4-FFF2-40B4-BE49-F238E27FC236}">
-                <a16:creationId xmlns:a16="http://schemas.microsoft.com/office/drawing/2014/main" id="{3EC984D1-FB00-440E-B5AD-7E9224F390AC}"/>
+                <a16:creationId xmlns:a16="http://schemas.microsoft.com/office/drawing/2014/main" id="{A5D2BDEC-1BBA-4AE3-BACE-3DE1DA41212D}"/>
+              </a:ext>
+            </a:extLst>
+          </p:cNvPr>
+          <p:cNvSpPr>
+            <a:spLocks noGrp="1"/>
+          </p:cNvSpPr>
+          <p:nvPr>
+            <p:ph type="pic" idx="1"/>
+          </p:nvPr>
+        </p:nvSpPr>
+        <p:spPr/>
+      </p:sp>
+      <p:sp>
+        <p:nvSpPr>
+          <p:cNvPr id="8" name="Title 7">
+            <a:extLst>
+              <a:ext uri="{FF2B5EF4-FFF2-40B4-BE49-F238E27FC236}">
+                <a16:creationId xmlns:a16="http://schemas.microsoft.com/office/drawing/2014/main" id="{8904CA24-C7AE-4CDE-B649-D429D561F8ED}"/>
+              </a:ext>
+            </a:extLst>
+          </p:cNvPr>
+          <p:cNvSpPr>
+            <a:spLocks noGrp="1"/>
+          </p:cNvSpPr>
+          <p:nvPr>
+            <p:ph type="title"/>
+          </p:nvPr>
+        </p:nvSpPr>
+        <p:spPr/>
+        <p:txBody>
+          <a:bodyPr/>
+          <a:lstStyle/>
+          <a:p>
+            <a:endParaRPr lang="en-US" dirty="0"/>
+          </a:p>
+        </p:txBody>
+      </p:sp>
+      <p:sp>
+        <p:nvSpPr>
+          <p:cNvPr id="12" name="Text Placeholder 11">
+            <a:extLst>
+              <a:ext uri="{FF2B5EF4-FFF2-40B4-BE49-F238E27FC236}">
+                <a16:creationId xmlns:a16="http://schemas.microsoft.com/office/drawing/2014/main" id="{C7380D00-7861-4B94-8BCE-68AA052BB741}"/>
+              </a:ext>
+            </a:extLst>
+          </p:cNvPr>
+          <p:cNvSpPr>
+            <a:spLocks noGrp="1"/>
+          </p:cNvSpPr>
+          <p:nvPr>
+            <p:ph type="body" sz="half" idx="2"/>
+          </p:nvPr>
+        </p:nvSpPr>
+        <p:spPr>
+          <a:xfrm>
+            <a:off x="6312842" y="2796171"/>
+            <a:ext cx="4400764" cy="2737845"/>
+          </a:xfrm>
+        </p:spPr>
+        <p:txBody>
+          <a:bodyPr/>
+          <a:lstStyle/>
+          <a:p>
+            <a:endParaRPr lang="en-US" dirty="0"/>
+          </a:p>
+        </p:txBody>
+      </p:sp>
+      <p:sp>
+        <p:nvSpPr>
+          <p:cNvPr id="21" name="TextBox 20">
+            <a:extLst>
+              <a:ext uri="{FF2B5EF4-FFF2-40B4-BE49-F238E27FC236}">
+                <a16:creationId xmlns:a16="http://schemas.microsoft.com/office/drawing/2014/main" id="{29E1B661-DF71-499F-ABAA-F71C8EED7E40}"/>
               </a:ext>
             </a:extLst>
           </p:cNvPr>
@@ -13859,8 +14080,8 @@
         </p:nvSpPr>
         <p:spPr>
           <a:xfrm>
-            <a:off x="544749" y="437744"/>
-            <a:ext cx="11155638" cy="1210011"/>
+            <a:off x="6312565" y="488343"/>
+            <a:ext cx="4400764" cy="584775"/>
           </a:xfrm>
           <a:prstGeom prst="rect">
             <a:avLst/>
@@ -13873,14 +14094,60 @@
           </a:bodyPr>
           <a:lstStyle/>
           <a:p>
-            <a:pPr>
-              <a:lnSpc>
-                <a:spcPct val="150000"/>
-              </a:lnSpc>
-            </a:pPr>
-            <a:r>
-              <a:rPr lang="en-US" sz="5400" dirty="0"/>
-              <a:t>Creepy Head</a:t>
+            <a:r>
+              <a:rPr lang="en-US" sz="3200" dirty="0" err="1">
+                <a:solidFill>
+                  <a:schemeClr val="bg1"/>
+                </a:solidFill>
+              </a:rPr>
+              <a:t>Talkng</a:t>
+            </a:r>
+            <a:r>
+              <a:rPr lang="en-US" sz="3200" dirty="0">
+                <a:solidFill>
+                  <a:schemeClr val="bg1"/>
+                </a:solidFill>
+              </a:rPr>
+              <a:t> Head…</a:t>
+            </a:r>
+          </a:p>
+        </p:txBody>
+      </p:sp>
+      <p:sp>
+        <p:nvSpPr>
+          <p:cNvPr id="110" name="TextBox 109">
+            <a:extLst>
+              <a:ext uri="{FF2B5EF4-FFF2-40B4-BE49-F238E27FC236}">
+                <a16:creationId xmlns:a16="http://schemas.microsoft.com/office/drawing/2014/main" id="{78884E23-76A5-4BA2-BBB1-C76C7A43A6B3}"/>
+              </a:ext>
+            </a:extLst>
+          </p:cNvPr>
+          <p:cNvSpPr txBox="1"/>
+          <p:nvPr/>
+        </p:nvSpPr>
+        <p:spPr>
+          <a:xfrm>
+            <a:off x="6312565" y="5698366"/>
+            <a:ext cx="4741153" cy="369332"/>
+          </a:xfrm>
+          <a:prstGeom prst="rect">
+            <a:avLst/>
+          </a:prstGeom>
+          <a:noFill/>
+        </p:spPr>
+        <p:txBody>
+          <a:bodyPr wrap="square">
+            <a:spAutoFit/>
+          </a:bodyPr>
+          <a:lstStyle/>
+          <a:p>
+            <a:r>
+              <a:rPr lang="en-US" dirty="0">
+                <a:solidFill>
+                  <a:schemeClr val="bg1"/>
+                </a:solidFill>
+              </a:rPr>
+              <a:t>https://github.com/pulcher/TalkingHead</a:t>
             </a:r>
           </a:p>
         </p:txBody>
@@ -13913,14 +14180,6 @@
 <file path=ppt/slides/slide15.xml><?xml version="1.0" encoding="utf-8"?>
 <p:sld xmlns:a="http://schemas.openxmlformats.org/drawingml/2006/main" xmlns:r="http://schemas.openxmlformats.org/officeDocument/2006/relationships" xmlns:p="http://schemas.openxmlformats.org/presentationml/2006/main">
   <p:cSld>
-    <p:bg>
-      <p:bgPr>
-        <a:solidFill>
-          <a:schemeClr val="accent1"/>
-        </a:solidFill>
-        <a:effectLst/>
-      </p:bgPr>
-    </p:bg>
     <p:spTree>
       <p:nvGrpSpPr>
         <p:cNvPr id="1" name=""/>
@@ -14039,14 +14298,6 @@
 <file path=ppt/slides/slide16.xml><?xml version="1.0" encoding="utf-8"?>
 <p:sld xmlns:a="http://schemas.openxmlformats.org/drawingml/2006/main" xmlns:r="http://schemas.openxmlformats.org/officeDocument/2006/relationships" xmlns:p="http://schemas.openxmlformats.org/presentationml/2006/main">
   <p:cSld>
-    <p:bg>
-      <p:bgPr>
-        <a:solidFill>
-          <a:schemeClr val="accent1"/>
-        </a:solidFill>
-        <a:effectLst/>
-      </p:bgPr>
-    </p:bg>
     <p:spTree>
       <p:nvGrpSpPr>
         <p:cNvPr id="1" name=""/>
@@ -14257,14 +14508,6 @@
 <file path=ppt/slides/slide17.xml><?xml version="1.0" encoding="utf-8"?>
 <p:sld xmlns:a="http://schemas.openxmlformats.org/drawingml/2006/main" xmlns:r="http://schemas.openxmlformats.org/officeDocument/2006/relationships" xmlns:p="http://schemas.openxmlformats.org/presentationml/2006/main">
   <p:cSld>
-    <p:bg>
-      <p:bgPr>
-        <a:solidFill>
-          <a:schemeClr val="accent1"/>
-        </a:solidFill>
-        <a:effectLst/>
-      </p:bgPr>
-    </p:bg>
     <p:spTree>
       <p:nvGrpSpPr>
         <p:cNvPr id="1" name=""/>
@@ -14623,8 +14866,8 @@
         </p:nvSpPr>
         <p:spPr>
           <a:xfrm>
-            <a:off x="630130" y="2023417"/>
-            <a:ext cx="10774818" cy="4201150"/>
+            <a:off x="708591" y="1176411"/>
+            <a:ext cx="10774818" cy="4839786"/>
           </a:xfrm>
           <a:prstGeom prst="rect">
             <a:avLst/>
@@ -14640,23 +14883,122 @@
           </a:bodyPr>
           <a:lstStyle/>
           <a:p>
-            <a:pPr marL="0" marR="0" lvl="0" indent="0" algn="l" defTabSz="914400" rtl="0" eaLnBrk="1" fontAlgn="auto" latinLnBrk="0" hangingPunct="1">
-              <a:lnSpc>
-                <a:spcPct val="100000"/>
-              </a:lnSpc>
-              <a:spcBef>
-                <a:spcPts val="0"/>
-              </a:spcBef>
-              <a:spcAft>
-                <a:spcPts val="0"/>
-              </a:spcAft>
-              <a:buClrTx/>
-              <a:buSzTx/>
-              <a:buFontTx/>
-              <a:buNone/>
-              <a:tabLst/>
+            <a:pPr>
               <a:defRPr/>
             </a:pPr>
+            <a:r>
+              <a:rPr lang="en-US" sz="2000" b="1" i="0" dirty="0">
+                <a:solidFill>
+                  <a:srgbClr val="FFFFFF"/>
+                </a:solidFill>
+                <a:effectLst/>
+                <a:latin typeface="Calibri" panose="020F0502020204030204" pitchFamily="34" charset="0"/>
+                <a:cs typeface="Calibri" panose="020F0502020204030204" pitchFamily="34" charset="0"/>
+              </a:rPr>
+              <a:t>Professional Scrum with Kanban (PSK) Certification Course</a:t>
+            </a:r>
+            <a:r>
+              <a:rPr lang="en-US" sz="2000" b="0" i="0" dirty="0">
+                <a:solidFill>
+                  <a:srgbClr val="FFFFFF"/>
+                </a:solidFill>
+                <a:effectLst/>
+                <a:latin typeface="Merriweather"/>
+              </a:rPr>
+              <a:t> </a:t>
+            </a:r>
+            <a:r>
+              <a:rPr lang="en-US" sz="2000" i="1" dirty="0">
+                <a:solidFill>
+                  <a:srgbClr val="FEFFFF"/>
+                </a:solidFill>
+                <a:latin typeface="Calibri" panose="020F0502020204030204" pitchFamily="34" charset="0"/>
+                <a:ea typeface="Open Sans" panose="020B0606030504020204" pitchFamily="34" charset="0"/>
+                <a:cs typeface="Calibri" panose="020F0502020204030204" pitchFamily="34" charset="0"/>
+              </a:rPr>
+              <a:t>January 26-27</a:t>
+            </a:r>
+            <a:endParaRPr kumimoji="0" lang="en-US" sz="2000" b="0" i="1" u="none" strike="noStrike" kern="1200" cap="none" spc="0" normalizeH="0" baseline="0" noProof="0" dirty="0">
+              <a:ln>
+                <a:noFill/>
+              </a:ln>
+              <a:solidFill>
+                <a:srgbClr val="FEFFFF"/>
+              </a:solidFill>
+              <a:effectLst/>
+              <a:uLnTx/>
+              <a:uFillTx/>
+              <a:latin typeface="Calibri" panose="020F0502020204030204" pitchFamily="34" charset="0"/>
+              <a:ea typeface="Open Sans" panose="020B0606030504020204" pitchFamily="34" charset="0"/>
+              <a:cs typeface="Calibri" panose="020F0502020204030204" pitchFamily="34" charset="0"/>
+            </a:endParaRPr>
+          </a:p>
+          <a:p>
+            <a:pPr lvl="0">
+              <a:spcAft>
+                <a:spcPts val="1500"/>
+              </a:spcAft>
+              <a:defRPr/>
+            </a:pPr>
+            <a:r>
+              <a:rPr lang="en-US" b="0" i="0" dirty="0">
+                <a:solidFill>
+                  <a:schemeClr val="accent6">
+                    <a:lumMod val="50000"/>
+                  </a:schemeClr>
+                </a:solidFill>
+                <a:effectLst/>
+                <a:latin typeface="Open Sans" panose="020B0606030504020204" pitchFamily="34" charset="0"/>
+                <a:ea typeface="Open Sans" panose="020B0606030504020204" pitchFamily="34" charset="0"/>
+                <a:cs typeface="Open Sans" panose="020B0606030504020204" pitchFamily="34" charset="0"/>
+              </a:rPr>
+              <a:t>where participants learn how to leverage Scrum to maximize the value of products </a:t>
+            </a:r>
+            <a:r>
+              <a:rPr lang="en-US" dirty="0">
+                <a:solidFill>
+                  <a:schemeClr val="accent6">
+                    <a:lumMod val="50000"/>
+                  </a:schemeClr>
+                </a:solidFill>
+                <a:latin typeface="Open Sans" panose="020B0606030504020204" pitchFamily="34" charset="0"/>
+                <a:ea typeface="Open Sans" panose="020B0606030504020204" pitchFamily="34" charset="0"/>
+                <a:cs typeface="Open Sans" panose="020B0606030504020204" pitchFamily="34" charset="0"/>
+              </a:rPr>
+              <a:t>and services The Professional Scrum Product Owner (PSPO) is a 2-day certification training (offered online and in person) .</a:t>
+            </a:r>
+            <a:endParaRPr kumimoji="0" lang="en-US" b="0" i="0" u="none" strike="noStrike" kern="1200" cap="none" spc="0" normalizeH="0" baseline="0" noProof="0" dirty="0">
+              <a:ln>
+                <a:noFill/>
+              </a:ln>
+              <a:solidFill>
+                <a:schemeClr val="accent6">
+                  <a:lumMod val="50000"/>
+                </a:schemeClr>
+              </a:solidFill>
+              <a:effectLst/>
+              <a:uLnTx/>
+              <a:uFillTx/>
+              <a:latin typeface="Open Sans" panose="020B0606030504020204" pitchFamily="34" charset="0"/>
+              <a:ea typeface="Open Sans" panose="020B0606030504020204" pitchFamily="34" charset="0"/>
+              <a:cs typeface="Open Sans" panose="020B0606030504020204" pitchFamily="34" charset="0"/>
+            </a:endParaRPr>
+          </a:p>
+          <a:p>
+            <a:pPr>
+              <a:defRPr/>
+            </a:pPr>
+            <a:r>
+              <a:rPr lang="en-US" sz="2000" b="1" i="0" dirty="0">
+                <a:solidFill>
+                  <a:srgbClr val="FFFFFF"/>
+                </a:solidFill>
+                <a:effectLst/>
+                <a:latin typeface="Calibri" panose="020F0502020204030204" pitchFamily="34" charset="0"/>
+                <a:cs typeface="Calibri" panose="020F0502020204030204" pitchFamily="34" charset="0"/>
+              </a:rPr>
+              <a:t>Professional Scrum Master (PSM) Certification Course</a:t>
+            </a:r>
             <a:r>
               <a:rPr kumimoji="0" lang="en-US" sz="2000" b="1" i="0" u="none" strike="noStrike" kern="1200" cap="none" spc="0" normalizeH="0" baseline="0" noProof="0" dirty="0">
                 <a:ln>
@@ -14672,7 +15014,7 @@
                 <a:ea typeface="Calibri" panose="020F0502020204030204" pitchFamily="34" charset="0"/>
                 <a:cs typeface="+mn-cs"/>
               </a:rPr>
-              <a:t>Acceptance &amp; Test-Driven Development Course </a:t>
+              <a:t> </a:t>
             </a:r>
             <a:r>
               <a:rPr lang="en-US" sz="2000" i="1" dirty="0">
@@ -14682,7 +15024,7 @@
                 <a:latin typeface="Calibri" panose="020F0502020204030204" pitchFamily="34" charset="0"/>
                 <a:ea typeface="Calibri" panose="020F0502020204030204" pitchFamily="34" charset="0"/>
               </a:rPr>
-              <a:t>November 17-19</a:t>
+              <a:t>February 09-10</a:t>
             </a:r>
             <a:endParaRPr kumimoji="0" lang="en-US" sz="2000" b="0" i="1" u="none" strike="noStrike" kern="1200" cap="none" spc="0" normalizeH="0" baseline="0" noProof="0" dirty="0">
               <a:ln>
@@ -14708,7 +15050,7 @@
                 <a:spcPts val="0"/>
               </a:spcBef>
               <a:spcAft>
-                <a:spcPts val="1500"/>
+                <a:spcPts val="0"/>
               </a:spcAft>
               <a:buClrTx/>
               <a:buSzTx/>
@@ -14718,114 +15060,18 @@
               <a:defRPr/>
             </a:pPr>
             <a:r>
-              <a:rPr kumimoji="0" lang="en-US" sz="1800" b="0" i="0" u="none" strike="noStrike" kern="1200" cap="none" spc="0" normalizeH="0" baseline="0" noProof="0" dirty="0">
-                <a:ln>
-                  <a:noFill/>
-                </a:ln>
-                <a:solidFill>
-                  <a:srgbClr val="002060"/>
+              <a:rPr lang="en-US" b="0" i="0" dirty="0">
+                <a:solidFill>
+                  <a:schemeClr val="bg1">
+                    <a:lumMod val="10000"/>
+                  </a:schemeClr>
                 </a:solidFill>
                 <a:effectLst/>
-                <a:uLnTx/>
-                <a:uFillTx/>
-                <a:latin typeface="Calibri" panose="020F0502020204030204" pitchFamily="34" charset="0"/>
-                <a:ea typeface="Calibri" panose="020F0502020204030204" pitchFamily="34" charset="0"/>
-                <a:cs typeface="+mn-cs"/>
+                <a:latin typeface="Open Sans" panose="020B0606030504020204" pitchFamily="34" charset="0"/>
+                <a:ea typeface="Open Sans" panose="020B0606030504020204" pitchFamily="34" charset="0"/>
+                <a:cs typeface="Open Sans" panose="020B0606030504020204" pitchFamily="34" charset="0"/>
               </a:rPr>
-              <a:t>The </a:t>
-            </a:r>
-            <a:r>
-              <a:rPr kumimoji="0" lang="en-US" sz="1800" b="0" i="0" u="sng" strike="noStrike" kern="1200" cap="none" spc="0" normalizeH="0" baseline="0" noProof="0" dirty="0">
-                <a:ln>
-                  <a:noFill/>
-                </a:ln>
-                <a:solidFill>
-                  <a:srgbClr val="002060"/>
-                </a:solidFill>
-                <a:effectLst/>
-                <a:uLnTx/>
-                <a:uFillTx/>
-                <a:latin typeface="Calibri" panose="020F0502020204030204" pitchFamily="34" charset="0"/>
-                <a:ea typeface="Calibri" panose="020F0502020204030204" pitchFamily="34" charset="0"/>
-                <a:cs typeface="+mn-cs"/>
-              </a:rPr>
-              <a:t>Acceptance &amp; Test-Dr</a:t>
-            </a:r>
-            <a:r>
-              <a:rPr lang="en-US" u="sng" dirty="0" err="1">
-                <a:solidFill>
-                  <a:srgbClr val="002060"/>
-                </a:solidFill>
-                <a:latin typeface="Calibri" panose="020F0502020204030204" pitchFamily="34" charset="0"/>
-                <a:ea typeface="Calibri" panose="020F0502020204030204" pitchFamily="34" charset="0"/>
-              </a:rPr>
-              <a:t>iven</a:t>
-            </a:r>
-            <a:r>
-              <a:rPr lang="en-US" u="sng" dirty="0">
-                <a:solidFill>
-                  <a:srgbClr val="002060"/>
-                </a:solidFill>
-                <a:latin typeface="Calibri" panose="020F0502020204030204" pitchFamily="34" charset="0"/>
-                <a:ea typeface="Calibri" panose="020F0502020204030204" pitchFamily="34" charset="0"/>
-              </a:rPr>
-              <a:t> Development</a:t>
-            </a:r>
-            <a:r>
-              <a:rPr kumimoji="0" lang="en-US" sz="1800" b="0" i="0" u="none" strike="noStrike" kern="1200" cap="none" spc="0" normalizeH="0" baseline="0" noProof="0" dirty="0">
-                <a:ln>
-                  <a:noFill/>
-                </a:ln>
-                <a:solidFill>
-                  <a:srgbClr val="002060"/>
-                </a:solidFill>
-                <a:effectLst/>
-                <a:uLnTx/>
-                <a:uFillTx/>
-                <a:latin typeface="Calibri" panose="020F0502020204030204" pitchFamily="34" charset="0"/>
-                <a:ea typeface="Calibri" panose="020F0502020204030204" pitchFamily="34" charset="0"/>
-                <a:cs typeface="+mn-cs"/>
-              </a:rPr>
-              <a:t> course is </a:t>
-            </a:r>
-            <a:r>
-              <a:rPr lang="en-US" b="1" i="0" dirty="0">
-                <a:solidFill>
-                  <a:srgbClr val="002060"/>
-                </a:solidFill>
-                <a:effectLst/>
-                <a:latin typeface="Calibri" panose="020F0502020204030204" pitchFamily="34" charset="0"/>
-                <a:cs typeface="Calibri" panose="020F0502020204030204" pitchFamily="34" charset="0"/>
-              </a:rPr>
-              <a:t>three-day instructor-led </a:t>
-            </a:r>
-            <a:r>
-              <a:rPr lang="en-US" b="0" i="0" dirty="0">
-                <a:solidFill>
-                  <a:srgbClr val="002060"/>
-                </a:solidFill>
-                <a:effectLst/>
-                <a:latin typeface="Calibri" panose="020F0502020204030204" pitchFamily="34" charset="0"/>
-                <a:cs typeface="Calibri" panose="020F0502020204030204" pitchFamily="34" charset="0"/>
-              </a:rPr>
-              <a:t>course simulates true agile development by mapping user stories to acceptance tests to test-first unit tests through realistic examples and exercises</a:t>
-            </a:r>
-            <a:r>
-              <a:rPr kumimoji="0" lang="en-US" sz="1800" b="0" i="0" u="none" strike="noStrike" kern="1200" cap="none" spc="0" normalizeH="0" baseline="0" noProof="0" dirty="0">
-                <a:ln>
-                  <a:noFill/>
-                </a:ln>
-                <a:solidFill>
-                  <a:srgbClr val="002060"/>
-                </a:solidFill>
-                <a:effectLst/>
-                <a:uLnTx/>
-                <a:uFillTx/>
-                <a:latin typeface="Calibri" panose="020F0502020204030204" pitchFamily="34" charset="0"/>
-                <a:ea typeface="Calibri" panose="020F0502020204030204" pitchFamily="34" charset="0"/>
-                <a:cs typeface="+mn-cs"/>
-              </a:rPr>
-              <a:t>.</a:t>
+              <a:t>Professional Scrum Master (PSM) is a 2-day certification course (offered online and in person) that explains the principles and empirical process theory behind the Scrum framework, and the important role that the Scrum Master has in it.</a:t>
             </a:r>
           </a:p>
           <a:p>
@@ -14846,6 +15092,38 @@
               <a:tabLst/>
               <a:defRPr/>
             </a:pPr>
+            <a:endParaRPr kumimoji="0" lang="en-US" sz="2000" b="1" i="0" u="none" strike="noStrike" kern="1200" cap="none" spc="0" normalizeH="0" baseline="0" noProof="0" dirty="0">
+              <a:ln>
+                <a:noFill/>
+              </a:ln>
+              <a:solidFill>
+                <a:schemeClr val="bg1">
+                  <a:lumMod val="10000"/>
+                </a:schemeClr>
+              </a:solidFill>
+              <a:effectLst/>
+              <a:uLnTx/>
+              <a:uFillTx/>
+              <a:latin typeface="Open Sans" panose="020B0606030504020204" pitchFamily="34" charset="0"/>
+              <a:ea typeface="Open Sans" panose="020B0606030504020204" pitchFamily="34" charset="0"/>
+              <a:cs typeface="Open Sans" panose="020B0606030504020204" pitchFamily="34" charset="0"/>
+            </a:endParaRPr>
+          </a:p>
+          <a:p>
+            <a:pPr>
+              <a:defRPr/>
+            </a:pPr>
+            <a:r>
+              <a:rPr lang="en-US" sz="2000" b="1" i="0" dirty="0">
+                <a:solidFill>
+                  <a:schemeClr val="bg1"/>
+                </a:solidFill>
+                <a:effectLst/>
+                <a:latin typeface="Calibri" panose="020F0502020204030204" pitchFamily="34" charset="0"/>
+                <a:cs typeface="Calibri" panose="020F0502020204030204" pitchFamily="34" charset="0"/>
+              </a:rPr>
+              <a:t>Professional Agile Leadership - Essentials (PAL-E) Certification Course</a:t>
+            </a:r>
             <a:r>
               <a:rPr kumimoji="0" lang="en-US" sz="2000" b="1" i="0" u="none" strike="noStrike" kern="1200" cap="none" spc="0" normalizeH="0" baseline="0" noProof="0" dirty="0">
                 <a:ln>
@@ -14861,7 +15139,7 @@
                 <a:ea typeface="Calibri" panose="020F0502020204030204" pitchFamily="34" charset="0"/>
                 <a:cs typeface="+mn-cs"/>
               </a:rPr>
-              <a:t>Object-Oriented Design with Test-Driven Development </a:t>
+              <a:t> </a:t>
             </a:r>
             <a:r>
               <a:rPr lang="en-US" sz="2000" i="1" dirty="0">
@@ -14871,7 +15149,7 @@
                 <a:latin typeface="Calibri" panose="020F0502020204030204" pitchFamily="34" charset="0"/>
                 <a:ea typeface="Calibri" panose="020F0502020204030204" pitchFamily="34" charset="0"/>
               </a:rPr>
-              <a:t>December 15-18</a:t>
+              <a:t>February 16-17</a:t>
             </a:r>
             <a:endParaRPr kumimoji="0" lang="en-US" sz="2000" b="0" i="1" u="none" strike="noStrike" kern="1200" cap="none" spc="0" normalizeH="0" baseline="0" noProof="0" dirty="0">
               <a:ln>
@@ -14897,206 +15175,6 @@
                 <a:spcPts val="0"/>
               </a:spcBef>
               <a:spcAft>
-                <a:spcPts val="0"/>
-              </a:spcAft>
-              <a:buClrTx/>
-              <a:buSzTx/>
-              <a:buFontTx/>
-              <a:buNone/>
-              <a:tabLst/>
-              <a:defRPr/>
-            </a:pPr>
-            <a:r>
-              <a:rPr kumimoji="0" lang="en-US" sz="1800" b="0" i="0" u="none" strike="noStrike" kern="1200" cap="none" spc="0" normalizeH="0" baseline="0" noProof="0" dirty="0">
-                <a:ln>
-                  <a:noFill/>
-                </a:ln>
-                <a:solidFill>
-                  <a:srgbClr val="002060"/>
-                </a:solidFill>
-                <a:effectLst/>
-                <a:uLnTx/>
-                <a:uFillTx/>
-                <a:latin typeface="Calibri" panose="020F0502020204030204" pitchFamily="34" charset="0"/>
-                <a:ea typeface="Calibri" panose="020F0502020204030204" pitchFamily="34" charset="0"/>
-                <a:cs typeface="+mn-cs"/>
-              </a:rPr>
-              <a:t>The </a:t>
-            </a:r>
-            <a:r>
-              <a:rPr kumimoji="0" lang="en-US" sz="1800" b="0" i="0" u="sng" strike="noStrike" kern="1200" cap="none" spc="0" normalizeH="0" baseline="0" noProof="0" dirty="0">
-                <a:ln>
-                  <a:noFill/>
-                </a:ln>
-                <a:solidFill>
-                  <a:srgbClr val="002060"/>
-                </a:solidFill>
-                <a:effectLst/>
-                <a:uLnTx/>
-                <a:uFillTx/>
-                <a:latin typeface="Calibri" panose="020F0502020204030204" pitchFamily="34" charset="0"/>
-                <a:ea typeface="Calibri" panose="020F0502020204030204" pitchFamily="34" charset="0"/>
-                <a:cs typeface="+mn-cs"/>
-              </a:rPr>
-              <a:t>Object-Oriented Design with Test-</a:t>
-            </a:r>
-            <a:r>
-              <a:rPr lang="en-US" u="sng" dirty="0">
-                <a:solidFill>
-                  <a:srgbClr val="002060"/>
-                </a:solidFill>
-                <a:latin typeface="Calibri" panose="020F0502020204030204" pitchFamily="34" charset="0"/>
-                <a:ea typeface="Calibri" panose="020F0502020204030204" pitchFamily="34" charset="0"/>
-              </a:rPr>
-              <a:t>Driven Development</a:t>
-            </a:r>
-            <a:r>
-              <a:rPr kumimoji="0" lang="en-US" sz="1800" b="0" i="0" u="none" strike="noStrike" kern="1200" cap="none" spc="0" normalizeH="0" baseline="0" noProof="0" dirty="0">
-                <a:ln>
-                  <a:noFill/>
-                </a:ln>
-                <a:solidFill>
-                  <a:srgbClr val="002060"/>
-                </a:solidFill>
-                <a:effectLst/>
-                <a:uLnTx/>
-                <a:uFillTx/>
-                <a:latin typeface="Calibri" panose="020F0502020204030204" pitchFamily="34" charset="0"/>
-                <a:ea typeface="Calibri" panose="020F0502020204030204" pitchFamily="34" charset="0"/>
-                <a:cs typeface="+mn-cs"/>
-              </a:rPr>
-              <a:t> course is </a:t>
-            </a:r>
-            <a:r>
-              <a:rPr lang="en-US" b="0" i="0" dirty="0">
-                <a:solidFill>
-                  <a:srgbClr val="002060"/>
-                </a:solidFill>
-                <a:effectLst/>
-                <a:latin typeface="Open Sans" panose="020B0606030504020204" pitchFamily="34" charset="0"/>
-              </a:rPr>
-              <a:t>four-day instructor-led course introduces the object-oriented design fundamentals, principles and heuristics using Test Driven Development (TDD) that allow us to create robust regression tests and good code</a:t>
-            </a:r>
-            <a:r>
-              <a:rPr kumimoji="0" lang="en-US" sz="1800" b="0" i="0" u="none" strike="noStrike" kern="1200" cap="none" spc="0" normalizeH="0" baseline="0" noProof="0" dirty="0">
-                <a:ln>
-                  <a:noFill/>
-                </a:ln>
-                <a:solidFill>
-                  <a:srgbClr val="002060"/>
-                </a:solidFill>
-                <a:effectLst/>
-                <a:uLnTx/>
-                <a:uFillTx/>
-                <a:latin typeface="Calibri" panose="020F0502020204030204" pitchFamily="34" charset="0"/>
-                <a:ea typeface="Calibri" panose="020F0502020204030204" pitchFamily="34" charset="0"/>
-                <a:cs typeface="+mn-cs"/>
-              </a:rPr>
-              <a:t>.  </a:t>
-            </a:r>
-          </a:p>
-          <a:p>
-            <a:pPr marL="0" marR="0" lvl="0" indent="0" algn="l" defTabSz="914400" rtl="0" eaLnBrk="1" fontAlgn="auto" latinLnBrk="0" hangingPunct="1">
-              <a:lnSpc>
-                <a:spcPct val="100000"/>
-              </a:lnSpc>
-              <a:spcBef>
-                <a:spcPts val="0"/>
-              </a:spcBef>
-              <a:spcAft>
-                <a:spcPts val="0"/>
-              </a:spcAft>
-              <a:buClrTx/>
-              <a:buSzTx/>
-              <a:buFontTx/>
-              <a:buNone/>
-              <a:tabLst/>
-              <a:defRPr/>
-            </a:pPr>
-            <a:endParaRPr kumimoji="0" lang="en-US" sz="2000" b="1" i="0" u="none" strike="noStrike" kern="1200" cap="none" spc="0" normalizeH="0" baseline="0" noProof="0" dirty="0">
-              <a:ln>
-                <a:noFill/>
-              </a:ln>
-              <a:solidFill>
-                <a:srgbClr val="002060"/>
-              </a:solidFill>
-              <a:effectLst/>
-              <a:uLnTx/>
-              <a:uFillTx/>
-              <a:latin typeface="Calibri" panose="020F0502020204030204" pitchFamily="34" charset="0"/>
-              <a:ea typeface="Calibri" panose="020F0502020204030204" pitchFamily="34" charset="0"/>
-              <a:cs typeface="+mn-cs"/>
-            </a:endParaRPr>
-          </a:p>
-          <a:p>
-            <a:pPr marL="0" marR="0" lvl="0" indent="0" algn="l" defTabSz="914400" rtl="0" eaLnBrk="1" fontAlgn="auto" latinLnBrk="0" hangingPunct="1">
-              <a:lnSpc>
-                <a:spcPct val="100000"/>
-              </a:lnSpc>
-              <a:spcBef>
-                <a:spcPts val="0"/>
-              </a:spcBef>
-              <a:spcAft>
-                <a:spcPts val="0"/>
-              </a:spcAft>
-              <a:buClrTx/>
-              <a:buSzTx/>
-              <a:buFontTx/>
-              <a:buNone/>
-              <a:tabLst/>
-              <a:defRPr/>
-            </a:pPr>
-            <a:r>
-              <a:rPr kumimoji="0" lang="en-US" sz="2000" b="1" i="0" u="none" strike="noStrike" kern="1200" cap="none" spc="0" normalizeH="0" baseline="0" noProof="0" dirty="0">
-                <a:ln>
-                  <a:noFill/>
-                </a:ln>
-                <a:solidFill>
-                  <a:srgbClr val="FEFFFF"/>
-                </a:solidFill>
-                <a:effectLst/>
-                <a:uLnTx/>
-                <a:uFillTx/>
-                <a:latin typeface="Calibri" panose="020F0502020204030204" pitchFamily="34" charset="0"/>
-                <a:ea typeface="Calibri" panose="020F0502020204030204" pitchFamily="34" charset="0"/>
-                <a:cs typeface="+mn-cs"/>
-              </a:rPr>
-              <a:t>PSPO </a:t>
-            </a:r>
-            <a:r>
-              <a:rPr lang="en-US" sz="2000" i="1" dirty="0">
-                <a:solidFill>
-                  <a:srgbClr val="FEFFFF"/>
-                </a:solidFill>
-                <a:latin typeface="Calibri" panose="020F0502020204030204" pitchFamily="34" charset="0"/>
-                <a:ea typeface="Calibri" panose="020F0502020204030204" pitchFamily="34" charset="0"/>
-              </a:rPr>
-              <a:t>November 10-11</a:t>
-            </a:r>
-            <a:endParaRPr kumimoji="0" lang="en-US" sz="2000" b="0" i="1" u="none" strike="noStrike" kern="1200" cap="none" spc="0" normalizeH="0" baseline="0" noProof="0" dirty="0">
-              <a:ln>
-                <a:noFill/>
-              </a:ln>
-              <a:solidFill>
-                <a:srgbClr val="FEFFFF"/>
-              </a:solidFill>
-              <a:effectLst/>
-              <a:uLnTx/>
-              <a:uFillTx/>
-              <a:latin typeface="Calibri" panose="020F0502020204030204" pitchFamily="34" charset="0"/>
-              <a:ea typeface="Calibri" panose="020F0502020204030204" pitchFamily="34" charset="0"/>
-              <a:cs typeface="+mn-cs"/>
-            </a:endParaRPr>
-          </a:p>
-          <a:p>
-            <a:pPr marL="0" marR="0" lvl="0" indent="0" algn="l" defTabSz="914400" rtl="0" eaLnBrk="1" fontAlgn="auto" latinLnBrk="0" hangingPunct="1">
-              <a:lnSpc>
-                <a:spcPct val="100000"/>
-              </a:lnSpc>
-              <a:spcBef>
-                <a:spcPts val="0"/>
-              </a:spcBef>
-              <a:spcAft>
                 <a:spcPts val="1500"/>
               </a:spcAft>
               <a:buClrTx/>
@@ -15107,71 +15185,49 @@
               <a:defRPr/>
             </a:pPr>
             <a:r>
-              <a:rPr kumimoji="0" lang="en-US" sz="1800" b="0" i="0" u="sng" strike="noStrike" kern="1200" cap="none" spc="0" normalizeH="0" baseline="0" noProof="0" dirty="0">
-                <a:ln>
-                  <a:noFill/>
-                </a:ln>
-                <a:solidFill>
-                  <a:srgbClr val="002060"/>
+              <a:rPr lang="en-US" b="0" i="0" dirty="0">
+                <a:solidFill>
+                  <a:schemeClr val="bg1">
+                    <a:lumMod val="10000"/>
+                  </a:schemeClr>
                 </a:solidFill>
                 <a:effectLst/>
-                <a:uLnTx/>
-                <a:uFillTx/>
-                <a:latin typeface="Calibri" panose="020F0502020204030204" pitchFamily="34" charset="0"/>
-                <a:ea typeface="Calibri" panose="020F0502020204030204" pitchFamily="34" charset="0"/>
-                <a:cs typeface="+mn-cs"/>
-                <a:hlinkClick r:id="rId2">
-                  <a:extLst>
-                    <a:ext uri="{A12FA001-AC4F-418D-AE19-62706E023703}">
-                      <ahyp:hlinkClr xmlns:ahyp="http://schemas.microsoft.com/office/drawing/2018/hyperlinkcolor" val="tx"/>
-                    </a:ext>
-                  </a:extLst>
-                </a:hlinkClick>
+                <a:latin typeface="Open Sans" panose="020B0606030504020204" pitchFamily="34" charset="0"/>
               </a:rPr>
-              <a:t>The Professional Scrum Product Owner (PSPO</a:t>
-            </a:r>
-            <a:r>
-              <a:rPr kumimoji="0" lang="en-US" sz="1800" b="0" i="0" u="none" strike="noStrike" kern="1200" cap="none" spc="0" normalizeH="0" baseline="0" noProof="0" dirty="0">
-                <a:ln>
-                  <a:noFill/>
-                </a:ln>
-                <a:solidFill>
-                  <a:srgbClr val="002060"/>
+              <a:t>The </a:t>
+            </a:r>
+            <a:r>
+              <a:rPr lang="en-US" b="1" i="0" dirty="0">
+                <a:solidFill>
+                  <a:schemeClr val="bg1">
+                    <a:lumMod val="10000"/>
+                  </a:schemeClr>
                 </a:solidFill>
                 <a:effectLst/>
-                <a:uLnTx/>
-                <a:uFillTx/>
-                <a:latin typeface="Calibri" panose="020F0502020204030204" pitchFamily="34" charset="0"/>
-                <a:ea typeface="Calibri" panose="020F0502020204030204" pitchFamily="34" charset="0"/>
-                <a:cs typeface="+mn-cs"/>
+                <a:latin typeface="Open Sans" panose="020B0606030504020204" pitchFamily="34" charset="0"/>
               </a:rPr>
-              <a:t>) certification course is a 2-day course where participants learn how to leverage Scrum to maximize the value of products and services.</a:t>
-            </a:r>
-          </a:p>
-          <a:p>
-            <a:pPr marL="0" marR="0" lvl="0" indent="0" algn="ctr" defTabSz="914400" rtl="0" eaLnBrk="1" fontAlgn="auto" latinLnBrk="0" hangingPunct="1">
-              <a:lnSpc>
-                <a:spcPct val="100000"/>
-              </a:lnSpc>
-              <a:spcBef>
-                <a:spcPts val="0"/>
-              </a:spcBef>
-              <a:spcAft>
-                <a:spcPts val="0"/>
-              </a:spcAft>
-              <a:buClrTx/>
-              <a:buSzTx/>
-              <a:buFontTx/>
-              <a:buNone/>
-              <a:tabLst/>
-              <a:defRPr/>
-            </a:pPr>
+              <a:t>Professional Agile Leadership Essentials</a:t>
+            </a:r>
+            <a:r>
+              <a:rPr lang="en-US" b="0" i="0" dirty="0">
+                <a:solidFill>
+                  <a:schemeClr val="bg1">
+                    <a:lumMod val="10000"/>
+                  </a:schemeClr>
+                </a:solidFill>
+                <a:effectLst/>
+                <a:latin typeface="Open Sans" panose="020B0606030504020204" pitchFamily="34" charset="0"/>
+              </a:rPr>
+              <a:t> (PAL-E) course provides a foundation for the role that leaders play in creating the conditions for a successful Agile transformation. This course was developed by Scrum.org in collaboration with the Professional Scrum Trainer community. After the class, students are eligible for the PAL I assessment certification. If you pass the assessment, you will gain the industry recognized PAL I certification. This certification will NEVER expire, and it makes you part of an elite community of PAL I badge holders.</a:t>
+            </a:r>
             <a:endParaRPr kumimoji="0" lang="en-US" sz="1800" b="0" i="0" u="none" strike="noStrike" kern="1200" cap="none" spc="0" normalizeH="0" baseline="0" noProof="0" dirty="0">
               <a:ln>
                 <a:noFill/>
               </a:ln>
               <a:solidFill>
-                <a:srgbClr val="002060"/>
+                <a:schemeClr val="bg1">
+                  <a:lumMod val="10000"/>
+                </a:schemeClr>
               </a:solidFill>
               <a:effectLst/>
               <a:uLnTx/>
@@ -15295,7 +15351,7 @@
         </p:nvSpPr>
         <p:spPr>
           <a:xfrm>
-            <a:off x="2862197" y="5899759"/>
+            <a:off x="2878239" y="6016197"/>
             <a:ext cx="5924811" cy="707886"/>
           </a:xfrm>
           <a:prstGeom prst="rect">
@@ -15433,7 +15489,7 @@
           <a:bodyPr/>
           <a:lstStyle/>
           <a:p>
-            <a:endParaRPr lang="en-US"/>
+            <a:endParaRPr lang="en-US" dirty="0"/>
           </a:p>
         </p:txBody>
       </p:sp>
@@ -16166,14 +16222,6 @@
 <file path=ppt/slides/slide6.xml><?xml version="1.0" encoding="utf-8"?>
 <p:sld xmlns:a="http://schemas.openxmlformats.org/drawingml/2006/main" xmlns:r="http://schemas.openxmlformats.org/officeDocument/2006/relationships" xmlns:p="http://schemas.openxmlformats.org/presentationml/2006/main">
   <p:cSld>
-    <p:bg>
-      <p:bgPr>
-        <a:solidFill>
-          <a:schemeClr val="accent1"/>
-        </a:solidFill>
-        <a:effectLst/>
-      </p:bgPr>
-    </p:bg>
     <p:spTree>
       <p:nvGrpSpPr>
         <p:cNvPr id="1" name=""/>
@@ -16349,6 +16397,125 @@
           </a:prstGeom>
         </p:spPr>
       </p:pic>
+      <p:sp>
+        <p:nvSpPr>
+          <p:cNvPr id="7" name="TextBox 6">
+            <a:extLst>
+              <a:ext uri="{FF2B5EF4-FFF2-40B4-BE49-F238E27FC236}">
+                <a16:creationId xmlns:a16="http://schemas.microsoft.com/office/drawing/2014/main" id="{6437F83A-8DE3-4EEC-8AE8-E086BA3FB032}"/>
+              </a:ext>
+            </a:extLst>
+          </p:cNvPr>
+          <p:cNvSpPr txBox="1"/>
+          <p:nvPr/>
+        </p:nvSpPr>
+        <p:spPr>
+          <a:xfrm>
+            <a:off x="401053" y="689811"/>
+            <a:ext cx="6689558" cy="2123658"/>
+          </a:xfrm>
+          <a:prstGeom prst="rect">
+            <a:avLst/>
+          </a:prstGeom>
+          <a:noFill/>
+        </p:spPr>
+        <p:txBody>
+          <a:bodyPr wrap="square" rtlCol="0">
+            <a:spAutoFit/>
+          </a:bodyPr>
+          <a:lstStyle/>
+          <a:p>
+            <a:r>
+              <a:rPr lang="en-US" sz="6600" dirty="0"/>
+              <a:t>.NET 5 with a slice of Pi</a:t>
+            </a:r>
+          </a:p>
+        </p:txBody>
+      </p:sp>
+      <p:pic>
+        <p:nvPicPr>
+          <p:cNvPr id="9" name="Picture 8" descr="raspberry pi">
+            <a:extLst>
+              <a:ext uri="{FF2B5EF4-FFF2-40B4-BE49-F238E27FC236}">
+                <a16:creationId xmlns:a16="http://schemas.microsoft.com/office/drawing/2014/main" id="{B12BDCCE-BFE7-4B5E-A63B-8CBA9D7283AC}"/>
+              </a:ext>
+              <a:ext uri="{C183D7F6-B498-43B3-948B-1728B52AA6E4}">
+                <adec:decorative xmlns:adec="http://schemas.microsoft.com/office/drawing/2017/decorative" val="0"/>
+              </a:ext>
+            </a:extLst>
+          </p:cNvPr>
+          <p:cNvPicPr>
+            <a:picLocks noChangeAspect="1"/>
+          </p:cNvPicPr>
+          <p:nvPr/>
+        </p:nvPicPr>
+        <p:blipFill>
+          <a:blip r:embed="rId4">
+            <a:extLst>
+              <a:ext uri="{BEBA8EAE-BF5A-486C-A8C5-ECC9F3942E4B}">
+                <a14:imgProps xmlns:a14="http://schemas.microsoft.com/office/drawing/2010/main">
+                  <a14:imgLayer r:embed="rId5">
+                    <a14:imgEffect>
+                      <a14:backgroundRemoval t="5584" b="89848" l="4688" r="94688">
+                        <a14:foregroundMark x1="15937" y1="66497" x2="4688" y2="58883"/>
+                        <a14:foregroundMark x1="4688" y1="58883" x2="9063" y2="45939"/>
+                        <a14:foregroundMark x1="13594" y1="57868" x2="15156" y2="63198"/>
+                        <a14:foregroundMark x1="31094" y1="56091" x2="40156" y2="58122"/>
+                        <a14:foregroundMark x1="29375" y1="53299" x2="25000" y2="61421"/>
+                        <a14:foregroundMark x1="38281" y1="60660" x2="37031" y2="69036"/>
+                        <a14:foregroundMark x1="30156" y1="71574" x2="26094" y2="69543"/>
+                        <a14:foregroundMark x1="30625" y1="72081" x2="30625" y2="72081"/>
+                        <a14:foregroundMark x1="31250" y1="72081" x2="30156" y2="71574"/>
+                        <a14:foregroundMark x1="58125" y1="73858" x2="56250" y2="75127"/>
+                        <a14:foregroundMark x1="56250" y1="75127" x2="56250" y2="75127"/>
+                        <a14:foregroundMark x1="57188" y1="74365" x2="56094" y2="57868"/>
+                        <a14:foregroundMark x1="52031" y1="67766" x2="55781" y2="74873"/>
+                        <a14:foregroundMark x1="70469" y1="46954" x2="81875" y2="73858"/>
+                        <a14:foregroundMark x1="83438" y1="49239" x2="84688" y2="76396"/>
+                        <a14:foregroundMark x1="91875" y1="53807" x2="88281" y2="81980"/>
+                        <a14:foregroundMark x1="76250" y1="33503" x2="82656" y2="43147"/>
+                        <a14:foregroundMark x1="78906" y1="28934" x2="92656" y2="46193"/>
+                        <a14:foregroundMark x1="87344" y1="32234" x2="93125" y2="41117"/>
+                        <a14:foregroundMark x1="94063" y1="33249" x2="93594" y2="47462"/>
+                        <a14:foregroundMark x1="93906" y1="27157" x2="94375" y2="17513"/>
+                        <a14:foregroundMark x1="80938" y1="17259" x2="94375" y2="21574"/>
+                        <a14:foregroundMark x1="84063" y1="24365" x2="76563" y2="21320"/>
+                        <a14:foregroundMark x1="81094" y1="19543" x2="81094" y2="14721"/>
+                        <a14:foregroundMark x1="82969" y1="16497" x2="93281" y2="19543"/>
+                        <a14:foregroundMark x1="92813" y1="18274" x2="81563" y2="14975"/>
+                        <a14:foregroundMark x1="94063" y1="19036" x2="81250" y2="13452"/>
+                        <a14:foregroundMark x1="94688" y1="19289" x2="94063" y2="16497"/>
+                        <a14:foregroundMark x1="94063" y1="17005" x2="90313" y2="15482"/>
+                        <a14:foregroundMark x1="89063" y1="15482" x2="82969" y2="13452"/>
+                        <a14:foregroundMark x1="29844" y1="10152" x2="25938" y2="10152"/>
+                        <a14:foregroundMark x1="66406" y1="23096" x2="30625" y2="9645"/>
+                        <a14:foregroundMark x1="29844" y1="7868" x2="67188" y2="20558"/>
+                        <a14:foregroundMark x1="30000" y1="6599" x2="67500" y2="19036"/>
+                        <a14:foregroundMark x1="29688" y1="5584" x2="67188" y2="18528"/>
+                      </a14:backgroundRemoval>
+                    </a14:imgEffect>
+                  </a14:imgLayer>
+                </a14:imgProps>
+              </a:ext>
+              <a:ext uri="{28A0092B-C50C-407E-A947-70E740481C1C}">
+                <a14:useLocalDpi xmlns:a14="http://schemas.microsoft.com/office/drawing/2010/main" val="0"/>
+              </a:ext>
+            </a:extLst>
+          </a:blip>
+          <a:stretch>
+            <a:fillRect/>
+          </a:stretch>
+        </p:blipFill>
+        <p:spPr>
+          <a:xfrm>
+            <a:off x="3745832" y="1975672"/>
+            <a:ext cx="4047847" cy="2491956"/>
+          </a:xfrm>
+          <a:prstGeom prst="rect">
+            <a:avLst/>
+          </a:prstGeom>
+        </p:spPr>
+      </p:pic>
     </p:spTree>
     <p:extLst>
       <p:ext uri="{BB962C8B-B14F-4D97-AF65-F5344CB8AC3E}">
@@ -16365,14 +16532,6 @@
 <file path=ppt/slides/slide7.xml><?xml version="1.0" encoding="utf-8"?>
 <p:sld xmlns:a="http://schemas.openxmlformats.org/drawingml/2006/main" xmlns:r="http://schemas.openxmlformats.org/officeDocument/2006/relationships" xmlns:p="http://schemas.openxmlformats.org/presentationml/2006/main">
   <p:cSld>
-    <p:bg>
-      <p:bgPr>
-        <a:solidFill>
-          <a:schemeClr val="accent1"/>
-        </a:solidFill>
-        <a:effectLst/>
-      </p:bgPr>
-    </p:bg>
     <p:spTree>
       <p:nvGrpSpPr>
         <p:cNvPr id="1" name=""/>
@@ -16436,8 +16595,8 @@
         </p:nvSpPr>
         <p:spPr>
           <a:xfrm>
-            <a:off x="680024" y="1829408"/>
-            <a:ext cx="10554510" cy="3788858"/>
+            <a:off x="1899224" y="1708664"/>
+            <a:ext cx="6692326" cy="4896853"/>
           </a:xfrm>
           <a:prstGeom prst="rect">
             <a:avLst/>
@@ -16458,7 +16617,7 @@
               <a:buChar char="•"/>
             </a:pPr>
             <a:r>
-              <a:rPr lang="en-US" dirty="0"/>
+              <a:rPr lang="en-US" sz="2400" dirty="0"/>
               <a:t>Overview</a:t>
             </a:r>
           </a:p>
@@ -16471,7 +16630,7 @@
               <a:buChar char="•"/>
             </a:pPr>
             <a:r>
-              <a:rPr lang="en-US" dirty="0"/>
+              <a:rPr lang="en-US" sz="2400" dirty="0"/>
               <a:t>Requirements</a:t>
             </a:r>
           </a:p>
@@ -16484,8 +16643,8 @@
               <a:buChar char="•"/>
             </a:pPr>
             <a:r>
-              <a:rPr lang="en-US" dirty="0"/>
-              <a:t>Current Methodologies</a:t>
+              <a:rPr lang="en-US" sz="2400" dirty="0"/>
+              <a:t>Set It Up</a:t>
             </a:r>
           </a:p>
           <a:p>
@@ -16497,8 +16656,8 @@
               <a:buChar char="•"/>
             </a:pPr>
             <a:r>
-              <a:rPr lang="en-US" dirty="0"/>
-              <a:t>Pre-setup</a:t>
+              <a:rPr lang="en-US" sz="2400" dirty="0"/>
+              <a:t>Hello World!</a:t>
             </a:r>
           </a:p>
           <a:p>
@@ -16510,8 +16669,8 @@
               <a:buChar char="•"/>
             </a:pPr>
             <a:r>
-              <a:rPr lang="en-US" dirty="0"/>
-              <a:t>Setup Dev Env</a:t>
+              <a:rPr lang="en-US" sz="2400" dirty="0"/>
+              <a:t>Let’s make it better</a:t>
             </a:r>
           </a:p>
           <a:p>
@@ -16523,8 +16682,12 @@
               <a:buChar char="•"/>
             </a:pPr>
             <a:r>
-              <a:rPr lang="en-US" dirty="0"/>
-              <a:t>A little bit of Hello World!</a:t>
+              <a:rPr lang="en-US" sz="2400" dirty="0" err="1"/>
+              <a:t>Debuggin</a:t>
+            </a:r>
+            <a:r>
+              <a:rPr lang="en-US" sz="2400" dirty="0"/>
+              <a:t>’ the World!</a:t>
             </a:r>
           </a:p>
           <a:p>
@@ -16536,7 +16699,7 @@
               <a:buChar char="•"/>
             </a:pPr>
             <a:r>
-              <a:rPr lang="en-US" dirty="0"/>
+              <a:rPr lang="en-US" sz="2400" dirty="0"/>
               <a:t>Creepy Head</a:t>
             </a:r>
           </a:p>
@@ -16549,7 +16712,7 @@
               <a:buChar char="•"/>
             </a:pPr>
             <a:r>
-              <a:rPr lang="en-US" dirty="0"/>
+              <a:rPr lang="en-US" sz="2400" dirty="0"/>
               <a:t>My ask and questions</a:t>
             </a:r>
           </a:p>
@@ -16629,14 +16792,6 @@
 <file path=ppt/slides/slide8.xml><?xml version="1.0" encoding="utf-8"?>
 <p:sld xmlns:a="http://schemas.openxmlformats.org/drawingml/2006/main" xmlns:r="http://schemas.openxmlformats.org/officeDocument/2006/relationships" xmlns:p="http://schemas.openxmlformats.org/presentationml/2006/main">
   <p:cSld>
-    <p:bg>
-      <p:bgPr>
-        <a:solidFill>
-          <a:schemeClr val="accent1"/>
-        </a:solidFill>
-        <a:effectLst/>
-      </p:bgPr>
-    </p:bg>
     <p:spTree>
       <p:nvGrpSpPr>
         <p:cNvPr id="1" name=""/>
@@ -16665,8 +16820,8 @@
         </p:nvSpPr>
         <p:spPr>
           <a:xfrm>
-            <a:off x="1417834" y="770562"/>
-            <a:ext cx="5034337" cy="369332"/>
+            <a:off x="360559" y="189537"/>
+            <a:ext cx="3144641" cy="584775"/>
           </a:xfrm>
           <a:prstGeom prst="rect">
             <a:avLst/>
@@ -16680,7 +16835,7 @@
           <a:lstStyle/>
           <a:p>
             <a:r>
-              <a:rPr lang="en-US" dirty="0"/>
+              <a:rPr lang="en-US" sz="3200" dirty="0"/>
               <a:t>Overview</a:t>
             </a:r>
           </a:p>
@@ -16722,6 +16877,77 @@
           </a:prstGeom>
         </p:spPr>
       </p:pic>
+      <p:pic>
+        <p:nvPicPr>
+          <p:cNvPr id="7" name="Picture 6" descr="One platform for all">
+            <a:extLst>
+              <a:ext uri="{FF2B5EF4-FFF2-40B4-BE49-F238E27FC236}">
+                <a16:creationId xmlns:a16="http://schemas.microsoft.com/office/drawing/2014/main" id="{89DFFBB6-1484-4665-B336-8012DA00841F}"/>
+              </a:ext>
+            </a:extLst>
+          </p:cNvPr>
+          <p:cNvPicPr>
+            <a:picLocks noChangeAspect="1"/>
+          </p:cNvPicPr>
+          <p:nvPr/>
+        </p:nvPicPr>
+        <p:blipFill>
+          <a:blip r:embed="rId4">
+            <a:extLst>
+              <a:ext uri="{28A0092B-C50C-407E-A947-70E740481C1C}">
+                <a14:useLocalDpi xmlns:a14="http://schemas.microsoft.com/office/drawing/2010/main" val="0"/>
+              </a:ext>
+            </a:extLst>
+          </a:blip>
+          <a:stretch>
+            <a:fillRect/>
+          </a:stretch>
+        </p:blipFill>
+        <p:spPr>
+          <a:xfrm>
+            <a:off x="2851146" y="189537"/>
+            <a:ext cx="6078543" cy="3239463"/>
+          </a:xfrm>
+          <a:prstGeom prst="rect">
+            <a:avLst/>
+          </a:prstGeom>
+        </p:spPr>
+      </p:pic>
+      <p:pic>
+        <p:nvPicPr>
+          <p:cNvPr id="9" name="Picture 8" descr="Timeline">
+            <a:extLst>
+              <a:ext uri="{FF2B5EF4-FFF2-40B4-BE49-F238E27FC236}">
+                <a16:creationId xmlns:a16="http://schemas.microsoft.com/office/drawing/2014/main" id="{23DA07D0-EA88-4216-BE51-599C0091909A}"/>
+              </a:ext>
+            </a:extLst>
+          </p:cNvPr>
+          <p:cNvPicPr>
+            <a:picLocks noChangeAspect="1"/>
+          </p:cNvPicPr>
+          <p:nvPr/>
+        </p:nvPicPr>
+        <p:blipFill rotWithShape="1">
+          <a:blip r:embed="rId5">
+            <a:extLst>
+              <a:ext uri="{28A0092B-C50C-407E-A947-70E740481C1C}">
+                <a14:useLocalDpi xmlns:a14="http://schemas.microsoft.com/office/drawing/2010/main" val="0"/>
+              </a:ext>
+            </a:extLst>
+          </a:blip>
+          <a:srcRect b="42971"/>
+          <a:stretch/>
+        </p:blipFill>
+        <p:spPr>
+          <a:xfrm>
+            <a:off x="771525" y="3560017"/>
+            <a:ext cx="9925050" cy="2907458"/>
+          </a:xfrm>
+          <a:prstGeom prst="rect">
+            <a:avLst/>
+          </a:prstGeom>
+        </p:spPr>
+      </p:pic>
     </p:spTree>
     <p:extLst>
       <p:ext uri="{BB962C8B-B14F-4D97-AF65-F5344CB8AC3E}">
@@ -16741,14 +16967,6 @@
 <file path=ppt/slides/slide9.xml><?xml version="1.0" encoding="utf-8"?>
 <p:sld xmlns:a="http://schemas.openxmlformats.org/drawingml/2006/main" xmlns:r="http://schemas.openxmlformats.org/officeDocument/2006/relationships" xmlns:p="http://schemas.openxmlformats.org/presentationml/2006/main">
   <p:cSld>
-    <p:bg>
-      <p:bgPr>
-        <a:solidFill>
-          <a:schemeClr val="accent1"/>
-        </a:solidFill>
-        <a:effectLst/>
-      </p:bgPr>
-    </p:bg>
     <p:spTree>
       <p:nvGrpSpPr>
         <p:cNvPr id="1" name=""/>
@@ -16768,7 +16986,7 @@
           <p:cNvPr id="4" name="Picture 3">
             <a:extLst>
               <a:ext uri="{FF2B5EF4-FFF2-40B4-BE49-F238E27FC236}">
-                <a16:creationId xmlns:a16="http://schemas.microsoft.com/office/drawing/2014/main" id="{80D5CEA1-C53A-4834-8C82-E758783E9249}"/>
+                <a16:creationId xmlns:a16="http://schemas.microsoft.com/office/drawing/2014/main" id="{60DF3BF5-3DF1-49F7-AF32-D442989440A0}"/>
               </a:ext>
             </a:extLst>
           </p:cNvPr>
@@ -16778,7 +16996,72 @@
           <p:nvPr/>
         </p:nvPicPr>
         <p:blipFill>
-          <a:blip r:embed="rId3">
+          <a:blip r:embed="rId3"/>
+          <a:stretch>
+            <a:fillRect/>
+          </a:stretch>
+        </p:blipFill>
+        <p:spPr>
+          <a:xfrm>
+            <a:off x="1785585" y="912102"/>
+            <a:ext cx="8620829" cy="5235963"/>
+          </a:xfrm>
+          <a:prstGeom prst="rect">
+            <a:avLst/>
+          </a:prstGeom>
+        </p:spPr>
+      </p:pic>
+      <p:sp>
+        <p:nvSpPr>
+          <p:cNvPr id="2" name="TextBox 1">
+            <a:extLst>
+              <a:ext uri="{FF2B5EF4-FFF2-40B4-BE49-F238E27FC236}">
+                <a16:creationId xmlns:a16="http://schemas.microsoft.com/office/drawing/2014/main" id="{5B67ADE6-653E-4A37-8EFE-B1484D3645EA}"/>
+              </a:ext>
+            </a:extLst>
+          </p:cNvPr>
+          <p:cNvSpPr txBox="1"/>
+          <p:nvPr/>
+        </p:nvSpPr>
+        <p:spPr>
+          <a:xfrm>
+            <a:off x="360559" y="189537"/>
+            <a:ext cx="5163941" cy="584775"/>
+          </a:xfrm>
+          <a:prstGeom prst="rect">
+            <a:avLst/>
+          </a:prstGeom>
+          <a:noFill/>
+        </p:spPr>
+        <p:txBody>
+          <a:bodyPr wrap="square" rtlCol="0">
+            <a:spAutoFit/>
+          </a:bodyPr>
+          <a:lstStyle/>
+          <a:p>
+            <a:r>
+              <a:rPr lang="en-US" sz="3200" dirty="0"/>
+              <a:t>So what distro can I use?</a:t>
+            </a:r>
+          </a:p>
+        </p:txBody>
+      </p:sp>
+      <p:pic>
+        <p:nvPicPr>
+          <p:cNvPr id="36" name="Picture 35">
+            <a:extLst>
+              <a:ext uri="{FF2B5EF4-FFF2-40B4-BE49-F238E27FC236}">
+                <a16:creationId xmlns:a16="http://schemas.microsoft.com/office/drawing/2014/main" id="{BB2EDA6D-6235-4D3C-BE44-572078B5D331}"/>
+              </a:ext>
+            </a:extLst>
+          </p:cNvPr>
+          <p:cNvPicPr>
+            <a:picLocks noChangeAspect="1"/>
+          </p:cNvPicPr>
+          <p:nvPr/>
+        </p:nvPicPr>
+        <p:blipFill>
+          <a:blip r:embed="rId4">
             <a:extLst>
               <a:ext uri="{28A0092B-C50C-407E-A947-70E740481C1C}">
                 <a14:useLocalDpi xmlns:a14="http://schemas.microsoft.com/office/drawing/2010/main" val="0"/>
@@ -16801,10 +17084,10 @@
       </p:pic>
       <p:sp>
         <p:nvSpPr>
-          <p:cNvPr id="9" name="TextBox 8">
+          <p:cNvPr id="10" name="TextBox 9">
             <a:extLst>
               <a:ext uri="{FF2B5EF4-FFF2-40B4-BE49-F238E27FC236}">
-                <a16:creationId xmlns:a16="http://schemas.microsoft.com/office/drawing/2014/main" id="{CE13B2C7-8710-4B96-8FDD-A270EBA25012}"/>
+                <a16:creationId xmlns:a16="http://schemas.microsoft.com/office/drawing/2014/main" id="{2AFE18C1-DC37-4750-A7F0-8036B00F8A05}"/>
               </a:ext>
             </a:extLst>
           </p:cNvPr>
@@ -16813,8 +17096,8 @@
         </p:nvSpPr>
         <p:spPr>
           <a:xfrm>
-            <a:off x="1417834" y="770562"/>
-            <a:ext cx="5034337" cy="369332"/>
+            <a:off x="3228975" y="6266864"/>
+            <a:ext cx="6096000" cy="369332"/>
           </a:xfrm>
           <a:prstGeom prst="rect">
             <a:avLst/>
@@ -16822,14 +17105,14 @@
           <a:noFill/>
         </p:spPr>
         <p:txBody>
-          <a:bodyPr wrap="square" rtlCol="0">
+          <a:bodyPr wrap="square">
             <a:spAutoFit/>
           </a:bodyPr>
           <a:lstStyle/>
           <a:p>
             <a:r>
               <a:rPr lang="en-US" dirty="0"/>
-              <a:t>Requirements</a:t>
+              <a:t>https://docs.microsoft.com/en-us/dotnet/core/install/linux</a:t>
             </a:r>
           </a:p>
         </p:txBody>
@@ -16837,25 +17120,16 @@
     </p:spTree>
     <p:extLst>
       <p:ext uri="{BB962C8B-B14F-4D97-AF65-F5344CB8AC3E}">
-        <p14:creationId xmlns:p14="http://schemas.microsoft.com/office/powerpoint/2010/main" val="1072499855"/>
+        <p14:creationId xmlns:p14="http://schemas.microsoft.com/office/powerpoint/2010/main" val="3156481056"/>
       </p:ext>
     </p:extLst>
   </p:cSld>
   <p:clrMapOvr>
     <a:masterClrMapping/>
   </p:clrMapOvr>
-  <mc:AlternateContent xmlns:mc="http://schemas.openxmlformats.org/markup-compatibility/2006" xmlns:p14="http://schemas.microsoft.com/office/powerpoint/2010/main">
-    <mc:Choice Requires="p14">
-      <p:transition spd="med" p14:dur="700">
-        <p:fade/>
-      </p:transition>
-    </mc:Choice>
-    <mc:Fallback xmlns="">
-      <p:transition spd="med">
-        <p:fade/>
-      </p:transition>
-    </mc:Fallback>
-  </mc:AlternateContent>
+  <p:transition>
+    <p:fade/>
+  </p:transition>
 </p:sld>
 </file>
 

</xml_diff>